<commit_message>
Fix typo Wes nicely pointed out for me.
</commit_message>
<xml_diff>
--- a/Initialization.pptx
+++ b/Initialization.pptx
@@ -152,7 +152,7 @@
           <p:cNvPr id="2" name="Header Placeholder 1">
             <a:extLst>
               <a:ext uri="{FF2B5EF4-FFF2-40B4-BE49-F238E27FC236}">
-                <a16:creationId xmlns:a16="http://schemas.microsoft.com/office/drawing/2014/main" xmlns="" id="{B76F666D-E0C2-435B-BAA8-9287F9E5D38A}"/>
+                <a16:creationId xmlns="" xmlns:a16="http://schemas.microsoft.com/office/drawing/2014/main" id="{B76F666D-E0C2-435B-BAA8-9287F9E5D38A}"/>
               </a:ext>
             </a:extLst>
           </p:cNvPr>
@@ -189,7 +189,7 @@
           <p:cNvPr id="3" name="Date Placeholder 2">
             <a:extLst>
               <a:ext uri="{FF2B5EF4-FFF2-40B4-BE49-F238E27FC236}">
-                <a16:creationId xmlns:a16="http://schemas.microsoft.com/office/drawing/2014/main" xmlns="" id="{19FEBCAF-CB3F-4928-91AA-D61472F880C0}"/>
+                <a16:creationId xmlns="" xmlns:a16="http://schemas.microsoft.com/office/drawing/2014/main" id="{19FEBCAF-CB3F-4928-91AA-D61472F880C0}"/>
               </a:ext>
             </a:extLst>
           </p:cNvPr>
@@ -219,7 +219,7 @@
           <a:p>
             <a:fld id="{EF1077DB-935E-4A0A-947A-D283B9F9F452}" type="datetimeFigureOut">
               <a:rPr lang="en-US" smtClean="0"/>
-              <a:t>6/24/2019</a:t>
+              <a:t>6/25/2019</a:t>
             </a:fld>
             <a:endParaRPr lang="en-US" dirty="0"/>
           </a:p>
@@ -230,7 +230,7 @@
           <p:cNvPr id="4" name="Footer Placeholder 3">
             <a:extLst>
               <a:ext uri="{FF2B5EF4-FFF2-40B4-BE49-F238E27FC236}">
-                <a16:creationId xmlns:a16="http://schemas.microsoft.com/office/drawing/2014/main" xmlns="" id="{69256698-63C6-4CCC-81CB-EA5604C30F1E}"/>
+                <a16:creationId xmlns="" xmlns:a16="http://schemas.microsoft.com/office/drawing/2014/main" id="{69256698-63C6-4CCC-81CB-EA5604C30F1E}"/>
               </a:ext>
             </a:extLst>
           </p:cNvPr>
@@ -267,7 +267,7 @@
           <p:cNvPr id="5" name="Slide Number Placeholder 4">
             <a:extLst>
               <a:ext uri="{FF2B5EF4-FFF2-40B4-BE49-F238E27FC236}">
-                <a16:creationId xmlns:a16="http://schemas.microsoft.com/office/drawing/2014/main" xmlns="" id="{B2467FDA-05D7-4760-A373-5D6AEAAF4278}"/>
+                <a16:creationId xmlns="" xmlns:a16="http://schemas.microsoft.com/office/drawing/2014/main" id="{B2467FDA-05D7-4760-A373-5D6AEAAF4278}"/>
               </a:ext>
             </a:extLst>
           </p:cNvPr>
@@ -396,7 +396,7 @@
           <a:p>
             <a:fld id="{2D9EC30E-1A71-4188-9BE7-E2A64929A436}" type="datetimeFigureOut">
               <a:rPr lang="en-US" noProof="0" smtClean="0"/>
-              <a:t>6/24/2019</a:t>
+              <a:t>6/25/2019</a:t>
             </a:fld>
             <a:endParaRPr lang="en-US" noProof="0" dirty="0"/>
           </a:p>
@@ -685,7 +685,7 @@
           <p:cNvPr id="15" name="Oval 14">
             <a:extLst>
               <a:ext uri="{FF2B5EF4-FFF2-40B4-BE49-F238E27FC236}">
-                <a16:creationId xmlns:a16="http://schemas.microsoft.com/office/drawing/2014/main" xmlns="" id="{901FAF19-EC05-4368-9C23-D1307429BBA4}"/>
+                <a16:creationId xmlns="" xmlns:a16="http://schemas.microsoft.com/office/drawing/2014/main" id="{901FAF19-EC05-4368-9C23-D1307429BBA4}"/>
               </a:ext>
             </a:extLst>
           </p:cNvPr>
@@ -735,7 +735,7 @@
           <p:cNvPr id="5" name="Rectangle 4">
             <a:extLst>
               <a:ext uri="{FF2B5EF4-FFF2-40B4-BE49-F238E27FC236}">
-                <a16:creationId xmlns:a16="http://schemas.microsoft.com/office/drawing/2014/main" xmlns="" id="{E6296D70-8C54-475E-8440-66769A72C583}"/>
+                <a16:creationId xmlns="" xmlns:a16="http://schemas.microsoft.com/office/drawing/2014/main" id="{E6296D70-8C54-475E-8440-66769A72C583}"/>
               </a:ext>
             </a:extLst>
           </p:cNvPr>
@@ -785,7 +785,7 @@
           <p:cNvPr id="7" name="Rectangle 6">
             <a:extLst>
               <a:ext uri="{FF2B5EF4-FFF2-40B4-BE49-F238E27FC236}">
-                <a16:creationId xmlns:a16="http://schemas.microsoft.com/office/drawing/2014/main" xmlns="" id="{DBE77267-9F51-4226-989C-ED57465596ED}"/>
+                <a16:creationId xmlns="" xmlns:a16="http://schemas.microsoft.com/office/drawing/2014/main" id="{DBE77267-9F51-4226-989C-ED57465596ED}"/>
               </a:ext>
             </a:extLst>
           </p:cNvPr>
@@ -850,7 +850,7 @@
           <p:cNvPr id="8" name="Rectangle 7">
             <a:extLst>
               <a:ext uri="{FF2B5EF4-FFF2-40B4-BE49-F238E27FC236}">
-                <a16:creationId xmlns:a16="http://schemas.microsoft.com/office/drawing/2014/main" xmlns="" id="{0A2CC678-341F-44F8-AE2E-A6C84D75C56A}"/>
+                <a16:creationId xmlns="" xmlns:a16="http://schemas.microsoft.com/office/drawing/2014/main" id="{0A2CC678-341F-44F8-AE2E-A6C84D75C56A}"/>
               </a:ext>
             </a:extLst>
           </p:cNvPr>
@@ -915,7 +915,7 @@
           <p:cNvPr id="11" name="Rectangle 10">
             <a:extLst>
               <a:ext uri="{FF2B5EF4-FFF2-40B4-BE49-F238E27FC236}">
-                <a16:creationId xmlns:a16="http://schemas.microsoft.com/office/drawing/2014/main" xmlns="" id="{A87A001A-FE8B-41CE-AC81-69D4A2339087}"/>
+                <a16:creationId xmlns="" xmlns:a16="http://schemas.microsoft.com/office/drawing/2014/main" id="{A87A001A-FE8B-41CE-AC81-69D4A2339087}"/>
               </a:ext>
             </a:extLst>
           </p:cNvPr>
@@ -980,7 +980,7 @@
           <p:cNvPr id="12" name="Rectangle 11">
             <a:extLst>
               <a:ext uri="{FF2B5EF4-FFF2-40B4-BE49-F238E27FC236}">
-                <a16:creationId xmlns:a16="http://schemas.microsoft.com/office/drawing/2014/main" xmlns="" id="{CB1416AC-94BD-4442-B771-E1ACAA70367E}"/>
+                <a16:creationId xmlns="" xmlns:a16="http://schemas.microsoft.com/office/drawing/2014/main" id="{CB1416AC-94BD-4442-B771-E1ACAA70367E}"/>
               </a:ext>
             </a:extLst>
           </p:cNvPr>
@@ -1045,7 +1045,7 @@
           <p:cNvPr id="13" name="Freeform: Shape 12">
             <a:extLst>
               <a:ext uri="{FF2B5EF4-FFF2-40B4-BE49-F238E27FC236}">
-                <a16:creationId xmlns:a16="http://schemas.microsoft.com/office/drawing/2014/main" xmlns="" id="{BDB31DC4-A207-4A23-8E7A-40D0ECD04FDD}"/>
+                <a16:creationId xmlns="" xmlns:a16="http://schemas.microsoft.com/office/drawing/2014/main" id="{BDB31DC4-A207-4A23-8E7A-40D0ECD04FDD}"/>
               </a:ext>
             </a:extLst>
           </p:cNvPr>
@@ -1240,7 +1240,7 @@
           <p:cNvPr id="9" name="Picture Placeholder 1">
             <a:extLst>
               <a:ext uri="{FF2B5EF4-FFF2-40B4-BE49-F238E27FC236}">
-                <a16:creationId xmlns:a16="http://schemas.microsoft.com/office/drawing/2014/main" xmlns="" id="{837F9836-5B23-424D-8C60-AC02A8512A4B}"/>
+                <a16:creationId xmlns="" xmlns:a16="http://schemas.microsoft.com/office/drawing/2014/main" id="{837F9836-5B23-424D-8C60-AC02A8512A4B}"/>
               </a:ext>
             </a:extLst>
           </p:cNvPr>
@@ -1284,7 +1284,7 @@
           <p:cNvPr id="2" name="Title 1">
             <a:extLst>
               <a:ext uri="{FF2B5EF4-FFF2-40B4-BE49-F238E27FC236}">
-                <a16:creationId xmlns:a16="http://schemas.microsoft.com/office/drawing/2014/main" xmlns="" id="{00F23EB7-E336-46EB-A4A0-3DB7A6BF4CE1}"/>
+                <a16:creationId xmlns="" xmlns:a16="http://schemas.microsoft.com/office/drawing/2014/main" id="{00F23EB7-E336-46EB-A4A0-3DB7A6BF4CE1}"/>
               </a:ext>
             </a:extLst>
           </p:cNvPr>
@@ -1343,7 +1343,7 @@
           <p:cNvPr id="3" name="Subtitle 2">
             <a:extLst>
               <a:ext uri="{FF2B5EF4-FFF2-40B4-BE49-F238E27FC236}">
-                <a16:creationId xmlns:a16="http://schemas.microsoft.com/office/drawing/2014/main" xmlns="" id="{C9980B88-3F4A-4688-9ED0-17EF37E62D93}"/>
+                <a16:creationId xmlns="" xmlns:a16="http://schemas.microsoft.com/office/drawing/2014/main" id="{C9980B88-3F4A-4688-9ED0-17EF37E62D93}"/>
               </a:ext>
             </a:extLst>
           </p:cNvPr>
@@ -1478,7 +1478,7 @@
           <p:cNvPr id="4" name="Footer Placeholder 3">
             <a:extLst>
               <a:ext uri="{FF2B5EF4-FFF2-40B4-BE49-F238E27FC236}">
-                <a16:creationId xmlns:a16="http://schemas.microsoft.com/office/drawing/2014/main" xmlns="" id="{E8FE0EB3-0FF4-4285-B9D3-90A5751B7BBF}"/>
+                <a16:creationId xmlns="" xmlns:a16="http://schemas.microsoft.com/office/drawing/2014/main" id="{E8FE0EB3-0FF4-4285-B9D3-90A5751B7BBF}"/>
               </a:ext>
             </a:extLst>
           </p:cNvPr>
@@ -1506,7 +1506,7 @@
           <p:cNvPr id="5" name="Slide Number Placeholder 4">
             <a:extLst>
               <a:ext uri="{FF2B5EF4-FFF2-40B4-BE49-F238E27FC236}">
-                <a16:creationId xmlns:a16="http://schemas.microsoft.com/office/drawing/2014/main" xmlns="" id="{7456F629-658F-4B7E-A1D1-2522EA76B0DD}"/>
+                <a16:creationId xmlns="" xmlns:a16="http://schemas.microsoft.com/office/drawing/2014/main" id="{7456F629-658F-4B7E-A1D1-2522EA76B0DD}"/>
               </a:ext>
             </a:extLst>
           </p:cNvPr>
@@ -1536,7 +1536,7 @@
           <p:cNvPr id="6" name="Title 5">
             <a:extLst>
               <a:ext uri="{FF2B5EF4-FFF2-40B4-BE49-F238E27FC236}">
-                <a16:creationId xmlns:a16="http://schemas.microsoft.com/office/drawing/2014/main" xmlns="" id="{35380A33-49FB-43FC-B60E-34A2E555638E}"/>
+                <a16:creationId xmlns="" xmlns:a16="http://schemas.microsoft.com/office/drawing/2014/main" id="{35380A33-49FB-43FC-B60E-34A2E555638E}"/>
               </a:ext>
             </a:extLst>
           </p:cNvPr>
@@ -1565,7 +1565,7 @@
           <p:cNvPr id="8" name="Content Placeholder 2">
             <a:extLst>
               <a:ext uri="{FF2B5EF4-FFF2-40B4-BE49-F238E27FC236}">
-                <a16:creationId xmlns:a16="http://schemas.microsoft.com/office/drawing/2014/main" xmlns="" id="{D0F16635-76F3-45F7-9385-A99504D2B901}"/>
+                <a16:creationId xmlns="" xmlns:a16="http://schemas.microsoft.com/office/drawing/2014/main" id="{D0F16635-76F3-45F7-9385-A99504D2B901}"/>
               </a:ext>
             </a:extLst>
           </p:cNvPr>
@@ -1711,7 +1711,7 @@
           <p:cNvPr id="4" name="Footer Placeholder 3">
             <a:extLst>
               <a:ext uri="{FF2B5EF4-FFF2-40B4-BE49-F238E27FC236}">
-                <a16:creationId xmlns:a16="http://schemas.microsoft.com/office/drawing/2014/main" xmlns="" id="{57847F90-9DB6-4832-9EB7-393AADAE8B70}"/>
+                <a16:creationId xmlns="" xmlns:a16="http://schemas.microsoft.com/office/drawing/2014/main" id="{57847F90-9DB6-4832-9EB7-393AADAE8B70}"/>
               </a:ext>
             </a:extLst>
           </p:cNvPr>
@@ -1739,7 +1739,7 @@
           <p:cNvPr id="5" name="Slide Number Placeholder 4">
             <a:extLst>
               <a:ext uri="{FF2B5EF4-FFF2-40B4-BE49-F238E27FC236}">
-                <a16:creationId xmlns:a16="http://schemas.microsoft.com/office/drawing/2014/main" xmlns="" id="{FF449EF3-C757-4F43-906C-DE0FF6262B2F}"/>
+                <a16:creationId xmlns="" xmlns:a16="http://schemas.microsoft.com/office/drawing/2014/main" id="{FF449EF3-C757-4F43-906C-DE0FF6262B2F}"/>
               </a:ext>
             </a:extLst>
           </p:cNvPr>
@@ -1769,7 +1769,7 @@
           <p:cNvPr id="8" name="Title 7">
             <a:extLst>
               <a:ext uri="{FF2B5EF4-FFF2-40B4-BE49-F238E27FC236}">
-                <a16:creationId xmlns:a16="http://schemas.microsoft.com/office/drawing/2014/main" xmlns="" id="{216924A5-8BD5-4AC6-84B9-2F1A4AFCF252}"/>
+                <a16:creationId xmlns="" xmlns:a16="http://schemas.microsoft.com/office/drawing/2014/main" id="{216924A5-8BD5-4AC6-84B9-2F1A4AFCF252}"/>
               </a:ext>
             </a:extLst>
           </p:cNvPr>
@@ -1798,7 +1798,7 @@
           <p:cNvPr id="9" name="Content Placeholder 3">
             <a:extLst>
               <a:ext uri="{FF2B5EF4-FFF2-40B4-BE49-F238E27FC236}">
-                <a16:creationId xmlns:a16="http://schemas.microsoft.com/office/drawing/2014/main" xmlns="" id="{70C8E421-28C0-4976-A17C-22789B6F3B18}"/>
+                <a16:creationId xmlns="" xmlns:a16="http://schemas.microsoft.com/office/drawing/2014/main" id="{70C8E421-28C0-4976-A17C-22789B6F3B18}"/>
               </a:ext>
             </a:extLst>
           </p:cNvPr>
@@ -1907,7 +1907,7 @@
           <p:cNvPr id="10" name="Content Placeholder 2">
             <a:extLst>
               <a:ext uri="{FF2B5EF4-FFF2-40B4-BE49-F238E27FC236}">
-                <a16:creationId xmlns:a16="http://schemas.microsoft.com/office/drawing/2014/main" xmlns="" id="{7AFEAA85-DD59-4B9B-B080-3368277EF650}"/>
+                <a16:creationId xmlns="" xmlns:a16="http://schemas.microsoft.com/office/drawing/2014/main" id="{7AFEAA85-DD59-4B9B-B080-3368277EF650}"/>
               </a:ext>
             </a:extLst>
           </p:cNvPr>
@@ -2046,7 +2046,7 @@
           <p:cNvPr id="4" name="Footer Placeholder 3">
             <a:extLst>
               <a:ext uri="{FF2B5EF4-FFF2-40B4-BE49-F238E27FC236}">
-                <a16:creationId xmlns:a16="http://schemas.microsoft.com/office/drawing/2014/main" xmlns="" id="{57847F90-9DB6-4832-9EB7-393AADAE8B70}"/>
+                <a16:creationId xmlns="" xmlns:a16="http://schemas.microsoft.com/office/drawing/2014/main" id="{57847F90-9DB6-4832-9EB7-393AADAE8B70}"/>
               </a:ext>
             </a:extLst>
           </p:cNvPr>
@@ -2074,7 +2074,7 @@
           <p:cNvPr id="5" name="Slide Number Placeholder 4">
             <a:extLst>
               <a:ext uri="{FF2B5EF4-FFF2-40B4-BE49-F238E27FC236}">
-                <a16:creationId xmlns:a16="http://schemas.microsoft.com/office/drawing/2014/main" xmlns="" id="{FF449EF3-C757-4F43-906C-DE0FF6262B2F}"/>
+                <a16:creationId xmlns="" xmlns:a16="http://schemas.microsoft.com/office/drawing/2014/main" id="{FF449EF3-C757-4F43-906C-DE0FF6262B2F}"/>
               </a:ext>
             </a:extLst>
           </p:cNvPr>
@@ -2104,7 +2104,7 @@
           <p:cNvPr id="8" name="Title 7">
             <a:extLst>
               <a:ext uri="{FF2B5EF4-FFF2-40B4-BE49-F238E27FC236}">
-                <a16:creationId xmlns:a16="http://schemas.microsoft.com/office/drawing/2014/main" xmlns="" id="{216924A5-8BD5-4AC6-84B9-2F1A4AFCF252}"/>
+                <a16:creationId xmlns="" xmlns:a16="http://schemas.microsoft.com/office/drawing/2014/main" id="{216924A5-8BD5-4AC6-84B9-2F1A4AFCF252}"/>
               </a:ext>
             </a:extLst>
           </p:cNvPr>
@@ -2133,7 +2133,7 @@
           <p:cNvPr id="12" name="Text Placeholder 4">
             <a:extLst>
               <a:ext uri="{FF2B5EF4-FFF2-40B4-BE49-F238E27FC236}">
-                <a16:creationId xmlns:a16="http://schemas.microsoft.com/office/drawing/2014/main" xmlns="" id="{1EAE3C73-B1A9-4A3B-8DD2-5A3492079001}"/>
+                <a16:creationId xmlns="" xmlns:a16="http://schemas.microsoft.com/office/drawing/2014/main" id="{1EAE3C73-B1A9-4A3B-8DD2-5A3492079001}"/>
               </a:ext>
             </a:extLst>
           </p:cNvPr>
@@ -2210,7 +2210,7 @@
           <p:cNvPr id="13" name="Content Placeholder 5">
             <a:extLst>
               <a:ext uri="{FF2B5EF4-FFF2-40B4-BE49-F238E27FC236}">
-                <a16:creationId xmlns:a16="http://schemas.microsoft.com/office/drawing/2014/main" xmlns="" id="{53A52FEF-F917-4982-9855-43A0DF5DA66B}"/>
+                <a16:creationId xmlns="" xmlns:a16="http://schemas.microsoft.com/office/drawing/2014/main" id="{53A52FEF-F917-4982-9855-43A0DF5DA66B}"/>
               </a:ext>
             </a:extLst>
           </p:cNvPr>
@@ -2319,7 +2319,7 @@
           <p:cNvPr id="14" name="Text Placeholder 2">
             <a:extLst>
               <a:ext uri="{FF2B5EF4-FFF2-40B4-BE49-F238E27FC236}">
-                <a16:creationId xmlns:a16="http://schemas.microsoft.com/office/drawing/2014/main" xmlns="" id="{DC1CA8AB-B7BE-4C9F-9A0A-C849A35AA645}"/>
+                <a16:creationId xmlns="" xmlns:a16="http://schemas.microsoft.com/office/drawing/2014/main" id="{DC1CA8AB-B7BE-4C9F-9A0A-C849A35AA645}"/>
               </a:ext>
             </a:extLst>
           </p:cNvPr>
@@ -2396,7 +2396,7 @@
           <p:cNvPr id="15" name="Content Placeholder 3">
             <a:extLst>
               <a:ext uri="{FF2B5EF4-FFF2-40B4-BE49-F238E27FC236}">
-                <a16:creationId xmlns:a16="http://schemas.microsoft.com/office/drawing/2014/main" xmlns="" id="{7B0DF164-9487-4D3F-BA7D-E273D7F5A2F5}"/>
+                <a16:creationId xmlns="" xmlns:a16="http://schemas.microsoft.com/office/drawing/2014/main" id="{7B0DF164-9487-4D3F-BA7D-E273D7F5A2F5}"/>
               </a:ext>
             </a:extLst>
           </p:cNvPr>
@@ -2535,7 +2535,7 @@
           <p:cNvPr id="9" name="Subtitle 2">
             <a:extLst>
               <a:ext uri="{FF2B5EF4-FFF2-40B4-BE49-F238E27FC236}">
-                <a16:creationId xmlns:a16="http://schemas.microsoft.com/office/drawing/2014/main" xmlns="" id="{F94EB5D3-F8CB-4E76-8D7E-FF441818EECB}"/>
+                <a16:creationId xmlns="" xmlns:a16="http://schemas.microsoft.com/office/drawing/2014/main" id="{F94EB5D3-F8CB-4E76-8D7E-FF441818EECB}"/>
               </a:ext>
             </a:extLst>
           </p:cNvPr>
@@ -2596,7 +2596,7 @@
           <p:cNvPr id="3" name="Content Placeholder 2">
             <a:extLst>
               <a:ext uri="{FF2B5EF4-FFF2-40B4-BE49-F238E27FC236}">
-                <a16:creationId xmlns:a16="http://schemas.microsoft.com/office/drawing/2014/main" xmlns="" id="{B1948E38-8FB0-4E51-A01C-C88794372E50}"/>
+                <a16:creationId xmlns="" xmlns:a16="http://schemas.microsoft.com/office/drawing/2014/main" id="{B1948E38-8FB0-4E51-A01C-C88794372E50}"/>
               </a:ext>
             </a:extLst>
           </p:cNvPr>
@@ -2705,7 +2705,7 @@
           <p:cNvPr id="4" name="Footer Placeholder 3">
             <a:extLst>
               <a:ext uri="{FF2B5EF4-FFF2-40B4-BE49-F238E27FC236}">
-                <a16:creationId xmlns:a16="http://schemas.microsoft.com/office/drawing/2014/main" xmlns="" id="{6D4BCA97-F31B-451D-82F8-6E000DF2118A}"/>
+                <a16:creationId xmlns="" xmlns:a16="http://schemas.microsoft.com/office/drawing/2014/main" id="{6D4BCA97-F31B-451D-82F8-6E000DF2118A}"/>
               </a:ext>
             </a:extLst>
           </p:cNvPr>
@@ -2733,7 +2733,7 @@
           <p:cNvPr id="6" name="Slide Number Placeholder 5">
             <a:extLst>
               <a:ext uri="{FF2B5EF4-FFF2-40B4-BE49-F238E27FC236}">
-                <a16:creationId xmlns:a16="http://schemas.microsoft.com/office/drawing/2014/main" xmlns="" id="{0817AAC4-A657-4D75-A527-0307AFF2B17B}"/>
+                <a16:creationId xmlns="" xmlns:a16="http://schemas.microsoft.com/office/drawing/2014/main" id="{0817AAC4-A657-4D75-A527-0307AFF2B17B}"/>
               </a:ext>
             </a:extLst>
           </p:cNvPr>
@@ -2763,7 +2763,7 @@
           <p:cNvPr id="7" name="Title 6">
             <a:extLst>
               <a:ext uri="{FF2B5EF4-FFF2-40B4-BE49-F238E27FC236}">
-                <a16:creationId xmlns:a16="http://schemas.microsoft.com/office/drawing/2014/main" xmlns="" id="{684F2FFD-7164-411A-96A5-A5211A6CAD45}"/>
+                <a16:creationId xmlns="" xmlns:a16="http://schemas.microsoft.com/office/drawing/2014/main" id="{684F2FFD-7164-411A-96A5-A5211A6CAD45}"/>
               </a:ext>
             </a:extLst>
           </p:cNvPr>
@@ -2792,7 +2792,7 @@
           <p:cNvPr id="10" name="Content Placeholder 2">
             <a:extLst>
               <a:ext uri="{FF2B5EF4-FFF2-40B4-BE49-F238E27FC236}">
-                <a16:creationId xmlns:a16="http://schemas.microsoft.com/office/drawing/2014/main" xmlns="" id="{34E38C26-A932-4007-84B1-21C1D9744A76}"/>
+                <a16:creationId xmlns="" xmlns:a16="http://schemas.microsoft.com/office/drawing/2014/main" id="{34E38C26-A932-4007-84B1-21C1D9744A76}"/>
               </a:ext>
             </a:extLst>
           </p:cNvPr>
@@ -2901,7 +2901,7 @@
           <p:cNvPr id="12" name="Content Placeholder 2">
             <a:extLst>
               <a:ext uri="{FF2B5EF4-FFF2-40B4-BE49-F238E27FC236}">
-                <a16:creationId xmlns:a16="http://schemas.microsoft.com/office/drawing/2014/main" xmlns="" id="{FA87EF18-D404-4A92-BE37-7AC9B7223D51}"/>
+                <a16:creationId xmlns="" xmlns:a16="http://schemas.microsoft.com/office/drawing/2014/main" id="{FA87EF18-D404-4A92-BE37-7AC9B7223D51}"/>
               </a:ext>
             </a:extLst>
           </p:cNvPr>
@@ -3040,7 +3040,7 @@
           <p:cNvPr id="10" name="Subtitle 2">
             <a:extLst>
               <a:ext uri="{FF2B5EF4-FFF2-40B4-BE49-F238E27FC236}">
-                <a16:creationId xmlns:a16="http://schemas.microsoft.com/office/drawing/2014/main" xmlns="" id="{9D7ACCB5-9A86-4F46-89E2-B79F48C9EC1D}"/>
+                <a16:creationId xmlns="" xmlns:a16="http://schemas.microsoft.com/office/drawing/2014/main" id="{9D7ACCB5-9A86-4F46-89E2-B79F48C9EC1D}"/>
               </a:ext>
             </a:extLst>
           </p:cNvPr>
@@ -3101,7 +3101,7 @@
           <p:cNvPr id="3" name="Content Placeholder 2">
             <a:extLst>
               <a:ext uri="{FF2B5EF4-FFF2-40B4-BE49-F238E27FC236}">
-                <a16:creationId xmlns:a16="http://schemas.microsoft.com/office/drawing/2014/main" xmlns="" id="{B1948E38-8FB0-4E51-A01C-C88794372E50}"/>
+                <a16:creationId xmlns="" xmlns:a16="http://schemas.microsoft.com/office/drawing/2014/main" id="{B1948E38-8FB0-4E51-A01C-C88794372E50}"/>
               </a:ext>
             </a:extLst>
           </p:cNvPr>
@@ -3210,7 +3210,7 @@
           <p:cNvPr id="5" name="Text Placeholder 4">
             <a:extLst>
               <a:ext uri="{FF2B5EF4-FFF2-40B4-BE49-F238E27FC236}">
-                <a16:creationId xmlns:a16="http://schemas.microsoft.com/office/drawing/2014/main" xmlns="" id="{1F5B3657-F2AE-455A-BF81-1A0C2ACECD20}"/>
+                <a16:creationId xmlns="" xmlns:a16="http://schemas.microsoft.com/office/drawing/2014/main" id="{1F5B3657-F2AE-455A-BF81-1A0C2ACECD20}"/>
               </a:ext>
             </a:extLst>
           </p:cNvPr>
@@ -3319,7 +3319,7 @@
           <p:cNvPr id="13" name="Text Placeholder 5">
             <a:extLst>
               <a:ext uri="{FF2B5EF4-FFF2-40B4-BE49-F238E27FC236}">
-                <a16:creationId xmlns:a16="http://schemas.microsoft.com/office/drawing/2014/main" xmlns="" id="{6A983D98-E0AB-429A-9EC2-B50D4216D691}"/>
+                <a16:creationId xmlns="" xmlns:a16="http://schemas.microsoft.com/office/drawing/2014/main" id="{6A983D98-E0AB-429A-9EC2-B50D4216D691}"/>
               </a:ext>
             </a:extLst>
           </p:cNvPr>
@@ -3428,7 +3428,7 @@
           <p:cNvPr id="15" name="Text Placeholder 6">
             <a:extLst>
               <a:ext uri="{FF2B5EF4-FFF2-40B4-BE49-F238E27FC236}">
-                <a16:creationId xmlns:a16="http://schemas.microsoft.com/office/drawing/2014/main" xmlns="" id="{755213BF-EF6D-45DC-A01B-DE6C2F23A6D2}"/>
+                <a16:creationId xmlns="" xmlns:a16="http://schemas.microsoft.com/office/drawing/2014/main" id="{755213BF-EF6D-45DC-A01B-DE6C2F23A6D2}"/>
               </a:ext>
             </a:extLst>
           </p:cNvPr>
@@ -3537,7 +3537,7 @@
           <p:cNvPr id="17" name="Text Placeholder 7">
             <a:extLst>
               <a:ext uri="{FF2B5EF4-FFF2-40B4-BE49-F238E27FC236}">
-                <a16:creationId xmlns:a16="http://schemas.microsoft.com/office/drawing/2014/main" xmlns="" id="{77D6BBBA-F4A3-45D4-91BC-A405FFDC7C3D}"/>
+                <a16:creationId xmlns="" xmlns:a16="http://schemas.microsoft.com/office/drawing/2014/main" id="{77D6BBBA-F4A3-45D4-91BC-A405FFDC7C3D}"/>
               </a:ext>
             </a:extLst>
           </p:cNvPr>
@@ -3646,7 +3646,7 @@
           <p:cNvPr id="4" name="Footer Placeholder 3">
             <a:extLst>
               <a:ext uri="{FF2B5EF4-FFF2-40B4-BE49-F238E27FC236}">
-                <a16:creationId xmlns:a16="http://schemas.microsoft.com/office/drawing/2014/main" xmlns="" id="{2D09234E-176D-4BBF-9391-7B6F018C51AB}"/>
+                <a16:creationId xmlns="" xmlns:a16="http://schemas.microsoft.com/office/drawing/2014/main" id="{2D09234E-176D-4BBF-9391-7B6F018C51AB}"/>
               </a:ext>
             </a:extLst>
           </p:cNvPr>
@@ -3674,7 +3674,7 @@
           <p:cNvPr id="6" name="Slide Number Placeholder 5">
             <a:extLst>
               <a:ext uri="{FF2B5EF4-FFF2-40B4-BE49-F238E27FC236}">
-                <a16:creationId xmlns:a16="http://schemas.microsoft.com/office/drawing/2014/main" xmlns="" id="{ED8B3FD9-234A-4B72-9A91-D7DD23D39CDC}"/>
+                <a16:creationId xmlns="" xmlns:a16="http://schemas.microsoft.com/office/drawing/2014/main" id="{ED8B3FD9-234A-4B72-9A91-D7DD23D39CDC}"/>
               </a:ext>
             </a:extLst>
           </p:cNvPr>
@@ -3704,7 +3704,7 @@
           <p:cNvPr id="7" name="Title 6">
             <a:extLst>
               <a:ext uri="{FF2B5EF4-FFF2-40B4-BE49-F238E27FC236}">
-                <a16:creationId xmlns:a16="http://schemas.microsoft.com/office/drawing/2014/main" xmlns="" id="{1FDBADDA-AF39-45A0-BBAB-A87608C0A8EB}"/>
+                <a16:creationId xmlns="" xmlns:a16="http://schemas.microsoft.com/office/drawing/2014/main" id="{1FDBADDA-AF39-45A0-BBAB-A87608C0A8EB}"/>
               </a:ext>
             </a:extLst>
           </p:cNvPr>
@@ -3770,7 +3770,7 @@
           <p:cNvPr id="7" name="Rectangle 6">
             <a:extLst>
               <a:ext uri="{FF2B5EF4-FFF2-40B4-BE49-F238E27FC236}">
-                <a16:creationId xmlns:a16="http://schemas.microsoft.com/office/drawing/2014/main" xmlns="" id="{DBE77267-9F51-4226-989C-ED57465596ED}"/>
+                <a16:creationId xmlns="" xmlns:a16="http://schemas.microsoft.com/office/drawing/2014/main" id="{DBE77267-9F51-4226-989C-ED57465596ED}"/>
               </a:ext>
             </a:extLst>
           </p:cNvPr>
@@ -3835,7 +3835,7 @@
           <p:cNvPr id="8" name="Rectangle 7">
             <a:extLst>
               <a:ext uri="{FF2B5EF4-FFF2-40B4-BE49-F238E27FC236}">
-                <a16:creationId xmlns:a16="http://schemas.microsoft.com/office/drawing/2014/main" xmlns="" id="{0A2CC678-341F-44F8-AE2E-A6C84D75C56A}"/>
+                <a16:creationId xmlns="" xmlns:a16="http://schemas.microsoft.com/office/drawing/2014/main" id="{0A2CC678-341F-44F8-AE2E-A6C84D75C56A}"/>
               </a:ext>
             </a:extLst>
           </p:cNvPr>
@@ -3900,7 +3900,7 @@
           <p:cNvPr id="11" name="Rectangle 10">
             <a:extLst>
               <a:ext uri="{FF2B5EF4-FFF2-40B4-BE49-F238E27FC236}">
-                <a16:creationId xmlns:a16="http://schemas.microsoft.com/office/drawing/2014/main" xmlns="" id="{A87A001A-FE8B-41CE-AC81-69D4A2339087}"/>
+                <a16:creationId xmlns="" xmlns:a16="http://schemas.microsoft.com/office/drawing/2014/main" id="{A87A001A-FE8B-41CE-AC81-69D4A2339087}"/>
               </a:ext>
             </a:extLst>
           </p:cNvPr>
@@ -3965,7 +3965,7 @@
           <p:cNvPr id="12" name="Rectangle 11">
             <a:extLst>
               <a:ext uri="{FF2B5EF4-FFF2-40B4-BE49-F238E27FC236}">
-                <a16:creationId xmlns:a16="http://schemas.microsoft.com/office/drawing/2014/main" xmlns="" id="{CB1416AC-94BD-4442-B771-E1ACAA70367E}"/>
+                <a16:creationId xmlns="" xmlns:a16="http://schemas.microsoft.com/office/drawing/2014/main" id="{CB1416AC-94BD-4442-B771-E1ACAA70367E}"/>
               </a:ext>
             </a:extLst>
           </p:cNvPr>
@@ -4030,7 +4030,7 @@
           <p:cNvPr id="13" name="Freeform: Shape 12">
             <a:extLst>
               <a:ext uri="{FF2B5EF4-FFF2-40B4-BE49-F238E27FC236}">
-                <a16:creationId xmlns:a16="http://schemas.microsoft.com/office/drawing/2014/main" xmlns="" id="{BDB31DC4-A207-4A23-8E7A-40D0ECD04FDD}"/>
+                <a16:creationId xmlns="" xmlns:a16="http://schemas.microsoft.com/office/drawing/2014/main" id="{BDB31DC4-A207-4A23-8E7A-40D0ECD04FDD}"/>
               </a:ext>
             </a:extLst>
           </p:cNvPr>
@@ -4225,7 +4225,7 @@
           <p:cNvPr id="2" name="Title 1">
             <a:extLst>
               <a:ext uri="{FF2B5EF4-FFF2-40B4-BE49-F238E27FC236}">
-                <a16:creationId xmlns:a16="http://schemas.microsoft.com/office/drawing/2014/main" xmlns="" id="{00F23EB7-E336-46EB-A4A0-3DB7A6BF4CE1}"/>
+                <a16:creationId xmlns="" xmlns:a16="http://schemas.microsoft.com/office/drawing/2014/main" id="{00F23EB7-E336-46EB-A4A0-3DB7A6BF4CE1}"/>
               </a:ext>
             </a:extLst>
           </p:cNvPr>
@@ -4284,7 +4284,7 @@
           <p:cNvPr id="3" name="Subtitle 2">
             <a:extLst>
               <a:ext uri="{FF2B5EF4-FFF2-40B4-BE49-F238E27FC236}">
-                <a16:creationId xmlns:a16="http://schemas.microsoft.com/office/drawing/2014/main" xmlns="" id="{C9980B88-3F4A-4688-9ED0-17EF37E62D93}"/>
+                <a16:creationId xmlns="" xmlns:a16="http://schemas.microsoft.com/office/drawing/2014/main" id="{C9980B88-3F4A-4688-9ED0-17EF37E62D93}"/>
               </a:ext>
             </a:extLst>
           </p:cNvPr>
@@ -4419,7 +4419,7 @@
           <p:cNvPr id="2" name="Title 1">
             <a:extLst>
               <a:ext uri="{FF2B5EF4-FFF2-40B4-BE49-F238E27FC236}">
-                <a16:creationId xmlns:a16="http://schemas.microsoft.com/office/drawing/2014/main" xmlns="" id="{00F23EB7-E336-46EB-A4A0-3DB7A6BF4CE1}"/>
+                <a16:creationId xmlns="" xmlns:a16="http://schemas.microsoft.com/office/drawing/2014/main" id="{00F23EB7-E336-46EB-A4A0-3DB7A6BF4CE1}"/>
               </a:ext>
             </a:extLst>
           </p:cNvPr>
@@ -4482,7 +4482,7 @@
           <p:cNvPr id="3" name="Subtitle 2">
             <a:extLst>
               <a:ext uri="{FF2B5EF4-FFF2-40B4-BE49-F238E27FC236}">
-                <a16:creationId xmlns:a16="http://schemas.microsoft.com/office/drawing/2014/main" xmlns="" id="{C9980B88-3F4A-4688-9ED0-17EF37E62D93}"/>
+                <a16:creationId xmlns="" xmlns:a16="http://schemas.microsoft.com/office/drawing/2014/main" id="{C9980B88-3F4A-4688-9ED0-17EF37E62D93}"/>
               </a:ext>
             </a:extLst>
           </p:cNvPr>
@@ -4580,7 +4580,7 @@
           <p:cNvPr id="5" name="Footer Placeholder 4">
             <a:extLst>
               <a:ext uri="{FF2B5EF4-FFF2-40B4-BE49-F238E27FC236}">
-                <a16:creationId xmlns:a16="http://schemas.microsoft.com/office/drawing/2014/main" xmlns="" id="{0CB24018-690B-4552-9994-3F090E16014A}"/>
+                <a16:creationId xmlns="" xmlns:a16="http://schemas.microsoft.com/office/drawing/2014/main" id="{0CB24018-690B-4552-9994-3F090E16014A}"/>
               </a:ext>
             </a:extLst>
           </p:cNvPr>
@@ -4608,7 +4608,7 @@
           <p:cNvPr id="10" name="Slide Number Placeholder 9">
             <a:extLst>
               <a:ext uri="{FF2B5EF4-FFF2-40B4-BE49-F238E27FC236}">
-                <a16:creationId xmlns:a16="http://schemas.microsoft.com/office/drawing/2014/main" xmlns="" id="{4D8B2323-066D-4AC1-9FC8-A06D7E8B5818}"/>
+                <a16:creationId xmlns="" xmlns:a16="http://schemas.microsoft.com/office/drawing/2014/main" id="{4D8B2323-066D-4AC1-9FC8-A06D7E8B5818}"/>
               </a:ext>
             </a:extLst>
           </p:cNvPr>
@@ -4675,7 +4675,7 @@
           <p:cNvPr id="5" name="Footer Placeholder 4">
             <a:extLst>
               <a:ext uri="{FF2B5EF4-FFF2-40B4-BE49-F238E27FC236}">
-                <a16:creationId xmlns:a16="http://schemas.microsoft.com/office/drawing/2014/main" xmlns="" id="{0CB24018-690B-4552-9994-3F090E16014A}"/>
+                <a16:creationId xmlns="" xmlns:a16="http://schemas.microsoft.com/office/drawing/2014/main" id="{0CB24018-690B-4552-9994-3F090E16014A}"/>
               </a:ext>
             </a:extLst>
           </p:cNvPr>
@@ -4703,7 +4703,7 @@
           <p:cNvPr id="10" name="Slide Number Placeholder 9">
             <a:extLst>
               <a:ext uri="{FF2B5EF4-FFF2-40B4-BE49-F238E27FC236}">
-                <a16:creationId xmlns:a16="http://schemas.microsoft.com/office/drawing/2014/main" xmlns="" id="{4D8B2323-066D-4AC1-9FC8-A06D7E8B5818}"/>
+                <a16:creationId xmlns="" xmlns:a16="http://schemas.microsoft.com/office/drawing/2014/main" id="{4D8B2323-066D-4AC1-9FC8-A06D7E8B5818}"/>
               </a:ext>
             </a:extLst>
           </p:cNvPr>
@@ -4733,7 +4733,7 @@
           <p:cNvPr id="8" name="Title 1">
             <a:extLst>
               <a:ext uri="{FF2B5EF4-FFF2-40B4-BE49-F238E27FC236}">
-                <a16:creationId xmlns:a16="http://schemas.microsoft.com/office/drawing/2014/main" xmlns="" id="{F30A9B71-A789-4057-B729-15D78CF34E05}"/>
+                <a16:creationId xmlns="" xmlns:a16="http://schemas.microsoft.com/office/drawing/2014/main" id="{F30A9B71-A789-4057-B729-15D78CF34E05}"/>
               </a:ext>
             </a:extLst>
           </p:cNvPr>
@@ -4792,7 +4792,7 @@
           <p:cNvPr id="15" name="Text Placeholder 3">
             <a:extLst>
               <a:ext uri="{FF2B5EF4-FFF2-40B4-BE49-F238E27FC236}">
-                <a16:creationId xmlns:a16="http://schemas.microsoft.com/office/drawing/2014/main" xmlns="" id="{4EF269EA-6AE9-449D-BE5A-03758EA88DDA}"/>
+                <a16:creationId xmlns="" xmlns:a16="http://schemas.microsoft.com/office/drawing/2014/main" id="{4EF269EA-6AE9-449D-BE5A-03758EA88DDA}"/>
               </a:ext>
             </a:extLst>
           </p:cNvPr>
@@ -4860,7 +4860,7 @@
           <p:cNvPr id="16" name="Content Placeholder 2">
             <a:extLst>
               <a:ext uri="{FF2B5EF4-FFF2-40B4-BE49-F238E27FC236}">
-                <a16:creationId xmlns:a16="http://schemas.microsoft.com/office/drawing/2014/main" xmlns="" id="{A473F491-E8FD-4CBC-84E6-5139D5161A9C}"/>
+                <a16:creationId xmlns="" xmlns:a16="http://schemas.microsoft.com/office/drawing/2014/main" id="{A473F491-E8FD-4CBC-84E6-5139D5161A9C}"/>
               </a:ext>
             </a:extLst>
           </p:cNvPr>
@@ -5011,7 +5011,7 @@
           <p:cNvPr id="5" name="Footer Placeholder 4">
             <a:extLst>
               <a:ext uri="{FF2B5EF4-FFF2-40B4-BE49-F238E27FC236}">
-                <a16:creationId xmlns:a16="http://schemas.microsoft.com/office/drawing/2014/main" xmlns="" id="{0CB24018-690B-4552-9994-3F090E16014A}"/>
+                <a16:creationId xmlns="" xmlns:a16="http://schemas.microsoft.com/office/drawing/2014/main" id="{0CB24018-690B-4552-9994-3F090E16014A}"/>
               </a:ext>
             </a:extLst>
           </p:cNvPr>
@@ -5039,7 +5039,7 @@
           <p:cNvPr id="10" name="Slide Number Placeholder 9">
             <a:extLst>
               <a:ext uri="{FF2B5EF4-FFF2-40B4-BE49-F238E27FC236}">
-                <a16:creationId xmlns:a16="http://schemas.microsoft.com/office/drawing/2014/main" xmlns="" id="{4D8B2323-066D-4AC1-9FC8-A06D7E8B5818}"/>
+                <a16:creationId xmlns="" xmlns:a16="http://schemas.microsoft.com/office/drawing/2014/main" id="{4D8B2323-066D-4AC1-9FC8-A06D7E8B5818}"/>
               </a:ext>
             </a:extLst>
           </p:cNvPr>
@@ -5069,7 +5069,7 @@
           <p:cNvPr id="8" name="Title 1">
             <a:extLst>
               <a:ext uri="{FF2B5EF4-FFF2-40B4-BE49-F238E27FC236}">
-                <a16:creationId xmlns:a16="http://schemas.microsoft.com/office/drawing/2014/main" xmlns="" id="{F30A9B71-A789-4057-B729-15D78CF34E05}"/>
+                <a16:creationId xmlns="" xmlns:a16="http://schemas.microsoft.com/office/drawing/2014/main" id="{F30A9B71-A789-4057-B729-15D78CF34E05}"/>
               </a:ext>
             </a:extLst>
           </p:cNvPr>
@@ -5128,7 +5128,7 @@
           <p:cNvPr id="9" name="Text Placeholder 3">
             <a:extLst>
               <a:ext uri="{FF2B5EF4-FFF2-40B4-BE49-F238E27FC236}">
-                <a16:creationId xmlns:a16="http://schemas.microsoft.com/office/drawing/2014/main" xmlns="" id="{AC12A5E3-4178-4927-9321-CCDE04B7D2A2}"/>
+                <a16:creationId xmlns="" xmlns:a16="http://schemas.microsoft.com/office/drawing/2014/main" id="{AC12A5E3-4178-4927-9321-CCDE04B7D2A2}"/>
               </a:ext>
             </a:extLst>
           </p:cNvPr>
@@ -5196,7 +5196,7 @@
           <p:cNvPr id="12" name="Picture Placeholder 2">
             <a:extLst>
               <a:ext uri="{FF2B5EF4-FFF2-40B4-BE49-F238E27FC236}">
-                <a16:creationId xmlns:a16="http://schemas.microsoft.com/office/drawing/2014/main" xmlns="" id="{73C2D913-09CE-4035-84E6-3144961151C2}"/>
+                <a16:creationId xmlns="" xmlns:a16="http://schemas.microsoft.com/office/drawing/2014/main" id="{73C2D913-09CE-4035-84E6-3144961151C2}"/>
               </a:ext>
             </a:extLst>
           </p:cNvPr>
@@ -5297,7 +5297,7 @@
           <p:cNvPr id="3" name="Footer Placeholder 2">
             <a:extLst>
               <a:ext uri="{FF2B5EF4-FFF2-40B4-BE49-F238E27FC236}">
-                <a16:creationId xmlns:a16="http://schemas.microsoft.com/office/drawing/2014/main" xmlns="" id="{08CCB8C2-B6A2-4C69-8D3A-57420A034BA4}"/>
+                <a16:creationId xmlns="" xmlns:a16="http://schemas.microsoft.com/office/drawing/2014/main" id="{08CCB8C2-B6A2-4C69-8D3A-57420A034BA4}"/>
               </a:ext>
             </a:extLst>
           </p:cNvPr>
@@ -5325,7 +5325,7 @@
           <p:cNvPr id="4" name="Slide Number Placeholder 3">
             <a:extLst>
               <a:ext uri="{FF2B5EF4-FFF2-40B4-BE49-F238E27FC236}">
-                <a16:creationId xmlns:a16="http://schemas.microsoft.com/office/drawing/2014/main" xmlns="" id="{6387D291-05F0-4DD7-A728-945B6C9F2382}"/>
+                <a16:creationId xmlns="" xmlns:a16="http://schemas.microsoft.com/office/drawing/2014/main" id="{6387D291-05F0-4DD7-A728-945B6C9F2382}"/>
               </a:ext>
             </a:extLst>
           </p:cNvPr>
@@ -5355,7 +5355,7 @@
           <p:cNvPr id="6" name="Title 5">
             <a:extLst>
               <a:ext uri="{FF2B5EF4-FFF2-40B4-BE49-F238E27FC236}">
-                <a16:creationId xmlns:a16="http://schemas.microsoft.com/office/drawing/2014/main" xmlns="" id="{61A6105F-5309-4A56-AAF2-8D4A0477F00A}"/>
+                <a16:creationId xmlns="" xmlns:a16="http://schemas.microsoft.com/office/drawing/2014/main" id="{61A6105F-5309-4A56-AAF2-8D4A0477F00A}"/>
               </a:ext>
             </a:extLst>
           </p:cNvPr>
@@ -5414,7 +5414,7 @@
           <p:cNvPr id="8" name="Oval 7">
             <a:extLst>
               <a:ext uri="{FF2B5EF4-FFF2-40B4-BE49-F238E27FC236}">
-                <a16:creationId xmlns:a16="http://schemas.microsoft.com/office/drawing/2014/main" xmlns="" id="{F6E7EBFD-F776-4FA5-B67B-AEAB104C7125}"/>
+                <a16:creationId xmlns="" xmlns:a16="http://schemas.microsoft.com/office/drawing/2014/main" id="{F6E7EBFD-F776-4FA5-B67B-AEAB104C7125}"/>
               </a:ext>
             </a:extLst>
           </p:cNvPr>
@@ -5464,7 +5464,7 @@
           <p:cNvPr id="9" name="Picture Placeholder 1">
             <a:extLst>
               <a:ext uri="{FF2B5EF4-FFF2-40B4-BE49-F238E27FC236}">
-                <a16:creationId xmlns:a16="http://schemas.microsoft.com/office/drawing/2014/main" xmlns="" id="{837F9836-5B23-424D-8C60-AC02A8512A4B}"/>
+                <a16:creationId xmlns="" xmlns:a16="http://schemas.microsoft.com/office/drawing/2014/main" id="{837F9836-5B23-424D-8C60-AC02A8512A4B}"/>
               </a:ext>
             </a:extLst>
           </p:cNvPr>
@@ -5508,7 +5508,7 @@
           <p:cNvPr id="2" name="Title 1">
             <a:extLst>
               <a:ext uri="{FF2B5EF4-FFF2-40B4-BE49-F238E27FC236}">
-                <a16:creationId xmlns:a16="http://schemas.microsoft.com/office/drawing/2014/main" xmlns="" id="{00F23EB7-E336-46EB-A4A0-3DB7A6BF4CE1}"/>
+                <a16:creationId xmlns="" xmlns:a16="http://schemas.microsoft.com/office/drawing/2014/main" id="{00F23EB7-E336-46EB-A4A0-3DB7A6BF4CE1}"/>
               </a:ext>
             </a:extLst>
           </p:cNvPr>
@@ -5567,7 +5567,7 @@
           <p:cNvPr id="3" name="Subtitle 2">
             <a:extLst>
               <a:ext uri="{FF2B5EF4-FFF2-40B4-BE49-F238E27FC236}">
-                <a16:creationId xmlns:a16="http://schemas.microsoft.com/office/drawing/2014/main" xmlns="" id="{C9980B88-3F4A-4688-9ED0-17EF37E62D93}"/>
+                <a16:creationId xmlns="" xmlns:a16="http://schemas.microsoft.com/office/drawing/2014/main" id="{C9980B88-3F4A-4688-9ED0-17EF37E62D93}"/>
               </a:ext>
             </a:extLst>
           </p:cNvPr>
@@ -5665,7 +5665,7 @@
           <p:cNvPr id="5" name="Footer Placeholder 4">
             <a:extLst>
               <a:ext uri="{FF2B5EF4-FFF2-40B4-BE49-F238E27FC236}">
-                <a16:creationId xmlns:a16="http://schemas.microsoft.com/office/drawing/2014/main" xmlns="" id="{0CB24018-690B-4552-9994-3F090E16014A}"/>
+                <a16:creationId xmlns="" xmlns:a16="http://schemas.microsoft.com/office/drawing/2014/main" id="{0CB24018-690B-4552-9994-3F090E16014A}"/>
               </a:ext>
             </a:extLst>
           </p:cNvPr>
@@ -5693,7 +5693,7 @@
           <p:cNvPr id="10" name="Slide Number Placeholder 9">
             <a:extLst>
               <a:ext uri="{FF2B5EF4-FFF2-40B4-BE49-F238E27FC236}">
-                <a16:creationId xmlns:a16="http://schemas.microsoft.com/office/drawing/2014/main" xmlns="" id="{4D8B2323-066D-4AC1-9FC8-A06D7E8B5818}"/>
+                <a16:creationId xmlns="" xmlns:a16="http://schemas.microsoft.com/office/drawing/2014/main" id="{4D8B2323-066D-4AC1-9FC8-A06D7E8B5818}"/>
               </a:ext>
             </a:extLst>
           </p:cNvPr>
@@ -5723,7 +5723,7 @@
           <p:cNvPr id="7" name="Oval 6">
             <a:extLst>
               <a:ext uri="{FF2B5EF4-FFF2-40B4-BE49-F238E27FC236}">
-                <a16:creationId xmlns:a16="http://schemas.microsoft.com/office/drawing/2014/main" xmlns="" id="{6901C03F-F087-4546-A9C3-5B5B81E3BD7B}"/>
+                <a16:creationId xmlns="" xmlns:a16="http://schemas.microsoft.com/office/drawing/2014/main" id="{6901C03F-F087-4546-A9C3-5B5B81E3BD7B}"/>
               </a:ext>
             </a:extLst>
           </p:cNvPr>
@@ -5810,7 +5810,7 @@
           <p:cNvPr id="3" name="Footer Placeholder 2">
             <a:extLst>
               <a:ext uri="{FF2B5EF4-FFF2-40B4-BE49-F238E27FC236}">
-                <a16:creationId xmlns:a16="http://schemas.microsoft.com/office/drawing/2014/main" xmlns="" id="{08CCB8C2-B6A2-4C69-8D3A-57420A034BA4}"/>
+                <a16:creationId xmlns="" xmlns:a16="http://schemas.microsoft.com/office/drawing/2014/main" id="{08CCB8C2-B6A2-4C69-8D3A-57420A034BA4}"/>
               </a:ext>
             </a:extLst>
           </p:cNvPr>
@@ -5838,7 +5838,7 @@
           <p:cNvPr id="4" name="Slide Number Placeholder 3">
             <a:extLst>
               <a:ext uri="{FF2B5EF4-FFF2-40B4-BE49-F238E27FC236}">
-                <a16:creationId xmlns:a16="http://schemas.microsoft.com/office/drawing/2014/main" xmlns="" id="{6387D291-05F0-4DD7-A728-945B6C9F2382}"/>
+                <a16:creationId xmlns="" xmlns:a16="http://schemas.microsoft.com/office/drawing/2014/main" id="{6387D291-05F0-4DD7-A728-945B6C9F2382}"/>
               </a:ext>
             </a:extLst>
           </p:cNvPr>
@@ -5868,7 +5868,7 @@
           <p:cNvPr id="6" name="Title 5">
             <a:extLst>
               <a:ext uri="{FF2B5EF4-FFF2-40B4-BE49-F238E27FC236}">
-                <a16:creationId xmlns:a16="http://schemas.microsoft.com/office/drawing/2014/main" xmlns="" id="{61A6105F-5309-4A56-AAF2-8D4A0477F00A}"/>
+                <a16:creationId xmlns="" xmlns:a16="http://schemas.microsoft.com/office/drawing/2014/main" id="{61A6105F-5309-4A56-AAF2-8D4A0477F00A}"/>
               </a:ext>
             </a:extLst>
           </p:cNvPr>
@@ -5897,7 +5897,7 @@
           <p:cNvPr id="5" name="Text Placeholder 4">
             <a:extLst>
               <a:ext uri="{FF2B5EF4-FFF2-40B4-BE49-F238E27FC236}">
-                <a16:creationId xmlns:a16="http://schemas.microsoft.com/office/drawing/2014/main" xmlns="" id="{DF9F7BF0-5084-45F6-AF52-A3013D439469}"/>
+                <a16:creationId xmlns="" xmlns:a16="http://schemas.microsoft.com/office/drawing/2014/main" id="{DF9F7BF0-5084-45F6-AF52-A3013D439469}"/>
               </a:ext>
             </a:extLst>
           </p:cNvPr>
@@ -5970,7 +5970,7 @@
           <p:cNvPr id="2" name="Footer Placeholder 1">
             <a:extLst>
               <a:ext uri="{FF2B5EF4-FFF2-40B4-BE49-F238E27FC236}">
-                <a16:creationId xmlns:a16="http://schemas.microsoft.com/office/drawing/2014/main" xmlns="" id="{16D0504D-4610-4E9E-A2DB-8B701F044BBC}"/>
+                <a16:creationId xmlns="" xmlns:a16="http://schemas.microsoft.com/office/drawing/2014/main" id="{16D0504D-4610-4E9E-A2DB-8B701F044BBC}"/>
               </a:ext>
             </a:extLst>
           </p:cNvPr>
@@ -5998,7 +5998,7 @@
           <p:cNvPr id="3" name="Slide Number Placeholder 2">
             <a:extLst>
               <a:ext uri="{FF2B5EF4-FFF2-40B4-BE49-F238E27FC236}">
-                <a16:creationId xmlns:a16="http://schemas.microsoft.com/office/drawing/2014/main" xmlns="" id="{BDA9BE28-009E-4D88-9951-81B453F75A4E}"/>
+                <a16:creationId xmlns="" xmlns:a16="http://schemas.microsoft.com/office/drawing/2014/main" id="{BDA9BE28-009E-4D88-9951-81B453F75A4E}"/>
               </a:ext>
             </a:extLst>
           </p:cNvPr>
@@ -6058,7 +6058,7 @@
           <p:cNvPr id="12" name="Oval 11">
             <a:extLst>
               <a:ext uri="{FF2B5EF4-FFF2-40B4-BE49-F238E27FC236}">
-                <a16:creationId xmlns:a16="http://schemas.microsoft.com/office/drawing/2014/main" xmlns="" id="{1AB7A8BA-0531-4A37-BB60-9E1CA4764B40}"/>
+                <a16:creationId xmlns="" xmlns:a16="http://schemas.microsoft.com/office/drawing/2014/main" id="{1AB7A8BA-0531-4A37-BB60-9E1CA4764B40}"/>
               </a:ext>
             </a:extLst>
           </p:cNvPr>
@@ -6108,7 +6108,7 @@
           <p:cNvPr id="9" name="Picture Placeholder 1">
             <a:extLst>
               <a:ext uri="{FF2B5EF4-FFF2-40B4-BE49-F238E27FC236}">
-                <a16:creationId xmlns:a16="http://schemas.microsoft.com/office/drawing/2014/main" xmlns="" id="{837F9836-5B23-424D-8C60-AC02A8512A4B}"/>
+                <a16:creationId xmlns="" xmlns:a16="http://schemas.microsoft.com/office/drawing/2014/main" id="{837F9836-5B23-424D-8C60-AC02A8512A4B}"/>
               </a:ext>
             </a:extLst>
           </p:cNvPr>
@@ -6152,7 +6152,7 @@
           <p:cNvPr id="2" name="Title 1">
             <a:extLst>
               <a:ext uri="{FF2B5EF4-FFF2-40B4-BE49-F238E27FC236}">
-                <a16:creationId xmlns:a16="http://schemas.microsoft.com/office/drawing/2014/main" xmlns="" id="{00F23EB7-E336-46EB-A4A0-3DB7A6BF4CE1}"/>
+                <a16:creationId xmlns="" xmlns:a16="http://schemas.microsoft.com/office/drawing/2014/main" id="{00F23EB7-E336-46EB-A4A0-3DB7A6BF4CE1}"/>
               </a:ext>
             </a:extLst>
           </p:cNvPr>
@@ -6215,7 +6215,7 @@
           <p:cNvPr id="3" name="Subtitle 2">
             <a:extLst>
               <a:ext uri="{FF2B5EF4-FFF2-40B4-BE49-F238E27FC236}">
-                <a16:creationId xmlns:a16="http://schemas.microsoft.com/office/drawing/2014/main" xmlns="" id="{C9980B88-3F4A-4688-9ED0-17EF37E62D93}"/>
+                <a16:creationId xmlns="" xmlns:a16="http://schemas.microsoft.com/office/drawing/2014/main" id="{C9980B88-3F4A-4688-9ED0-17EF37E62D93}"/>
               </a:ext>
             </a:extLst>
           </p:cNvPr>
@@ -6313,7 +6313,7 @@
           <p:cNvPr id="5" name="Footer Placeholder 4">
             <a:extLst>
               <a:ext uri="{FF2B5EF4-FFF2-40B4-BE49-F238E27FC236}">
-                <a16:creationId xmlns:a16="http://schemas.microsoft.com/office/drawing/2014/main" xmlns="" id="{0CB24018-690B-4552-9994-3F090E16014A}"/>
+                <a16:creationId xmlns="" xmlns:a16="http://schemas.microsoft.com/office/drawing/2014/main" id="{0CB24018-690B-4552-9994-3F090E16014A}"/>
               </a:ext>
             </a:extLst>
           </p:cNvPr>
@@ -6341,7 +6341,7 @@
           <p:cNvPr id="10" name="Slide Number Placeholder 9">
             <a:extLst>
               <a:ext uri="{FF2B5EF4-FFF2-40B4-BE49-F238E27FC236}">
-                <a16:creationId xmlns:a16="http://schemas.microsoft.com/office/drawing/2014/main" xmlns="" id="{4D8B2323-066D-4AC1-9FC8-A06D7E8B5818}"/>
+                <a16:creationId xmlns="" xmlns:a16="http://schemas.microsoft.com/office/drawing/2014/main" id="{4D8B2323-066D-4AC1-9FC8-A06D7E8B5818}"/>
               </a:ext>
             </a:extLst>
           </p:cNvPr>
@@ -6408,7 +6408,7 @@
           <p:cNvPr id="11" name="Oval 10">
             <a:extLst>
               <a:ext uri="{FF2B5EF4-FFF2-40B4-BE49-F238E27FC236}">
-                <a16:creationId xmlns:a16="http://schemas.microsoft.com/office/drawing/2014/main" xmlns="" id="{FE842FA8-E742-4FD8-BFA1-7B8A13828E76}"/>
+                <a16:creationId xmlns="" xmlns:a16="http://schemas.microsoft.com/office/drawing/2014/main" id="{FE842FA8-E742-4FD8-BFA1-7B8A13828E76}"/>
               </a:ext>
             </a:extLst>
           </p:cNvPr>
@@ -6458,7 +6458,7 @@
           <p:cNvPr id="8" name="Oval 7">
             <a:extLst>
               <a:ext uri="{FF2B5EF4-FFF2-40B4-BE49-F238E27FC236}">
-                <a16:creationId xmlns:a16="http://schemas.microsoft.com/office/drawing/2014/main" xmlns="" id="{23F5D8CC-DBBC-4E65-A552-C98514F1E2F9}"/>
+                <a16:creationId xmlns="" xmlns:a16="http://schemas.microsoft.com/office/drawing/2014/main" id="{23F5D8CC-DBBC-4E65-A552-C98514F1E2F9}"/>
               </a:ext>
             </a:extLst>
           </p:cNvPr>
@@ -6508,7 +6508,7 @@
           <p:cNvPr id="9" name="Picture Placeholder 1">
             <a:extLst>
               <a:ext uri="{FF2B5EF4-FFF2-40B4-BE49-F238E27FC236}">
-                <a16:creationId xmlns:a16="http://schemas.microsoft.com/office/drawing/2014/main" xmlns="" id="{837F9836-5B23-424D-8C60-AC02A8512A4B}"/>
+                <a16:creationId xmlns="" xmlns:a16="http://schemas.microsoft.com/office/drawing/2014/main" id="{837F9836-5B23-424D-8C60-AC02A8512A4B}"/>
               </a:ext>
             </a:extLst>
           </p:cNvPr>
@@ -6552,7 +6552,7 @@
           <p:cNvPr id="2" name="Title 1">
             <a:extLst>
               <a:ext uri="{FF2B5EF4-FFF2-40B4-BE49-F238E27FC236}">
-                <a16:creationId xmlns:a16="http://schemas.microsoft.com/office/drawing/2014/main" xmlns="" id="{00F23EB7-E336-46EB-A4A0-3DB7A6BF4CE1}"/>
+                <a16:creationId xmlns="" xmlns:a16="http://schemas.microsoft.com/office/drawing/2014/main" id="{00F23EB7-E336-46EB-A4A0-3DB7A6BF4CE1}"/>
               </a:ext>
             </a:extLst>
           </p:cNvPr>
@@ -6615,7 +6615,7 @@
           <p:cNvPr id="3" name="Subtitle 2">
             <a:extLst>
               <a:ext uri="{FF2B5EF4-FFF2-40B4-BE49-F238E27FC236}">
-                <a16:creationId xmlns:a16="http://schemas.microsoft.com/office/drawing/2014/main" xmlns="" id="{C9980B88-3F4A-4688-9ED0-17EF37E62D93}"/>
+                <a16:creationId xmlns="" xmlns:a16="http://schemas.microsoft.com/office/drawing/2014/main" id="{C9980B88-3F4A-4688-9ED0-17EF37E62D93}"/>
               </a:ext>
             </a:extLst>
           </p:cNvPr>
@@ -6713,7 +6713,7 @@
           <p:cNvPr id="12" name="Content Placeholder 2">
             <a:extLst>
               <a:ext uri="{FF2B5EF4-FFF2-40B4-BE49-F238E27FC236}">
-                <a16:creationId xmlns:a16="http://schemas.microsoft.com/office/drawing/2014/main" xmlns="" id="{23D3924F-A5EC-4141-A191-1A110C406AF7}"/>
+                <a16:creationId xmlns="" xmlns:a16="http://schemas.microsoft.com/office/drawing/2014/main" id="{23D3924F-A5EC-4141-A191-1A110C406AF7}"/>
               </a:ext>
             </a:extLst>
           </p:cNvPr>
@@ -6812,7 +6812,7 @@
           <p:cNvPr id="5" name="Footer Placeholder 4">
             <a:extLst>
               <a:ext uri="{FF2B5EF4-FFF2-40B4-BE49-F238E27FC236}">
-                <a16:creationId xmlns:a16="http://schemas.microsoft.com/office/drawing/2014/main" xmlns="" id="{0CB24018-690B-4552-9994-3F090E16014A}"/>
+                <a16:creationId xmlns="" xmlns:a16="http://schemas.microsoft.com/office/drawing/2014/main" id="{0CB24018-690B-4552-9994-3F090E16014A}"/>
               </a:ext>
             </a:extLst>
           </p:cNvPr>
@@ -6840,7 +6840,7 @@
           <p:cNvPr id="10" name="Slide Number Placeholder 9">
             <a:extLst>
               <a:ext uri="{FF2B5EF4-FFF2-40B4-BE49-F238E27FC236}">
-                <a16:creationId xmlns:a16="http://schemas.microsoft.com/office/drawing/2014/main" xmlns="" id="{4D8B2323-066D-4AC1-9FC8-A06D7E8B5818}"/>
+                <a16:creationId xmlns="" xmlns:a16="http://schemas.microsoft.com/office/drawing/2014/main" id="{4D8B2323-066D-4AC1-9FC8-A06D7E8B5818}"/>
               </a:ext>
             </a:extLst>
           </p:cNvPr>
@@ -6907,7 +6907,7 @@
           <p:cNvPr id="13" name="Oval 12">
             <a:extLst>
               <a:ext uri="{FF2B5EF4-FFF2-40B4-BE49-F238E27FC236}">
-                <a16:creationId xmlns:a16="http://schemas.microsoft.com/office/drawing/2014/main" xmlns="" id="{34827DBE-7690-48BE-8673-ABB67E101D80}"/>
+                <a16:creationId xmlns="" xmlns:a16="http://schemas.microsoft.com/office/drawing/2014/main" id="{34827DBE-7690-48BE-8673-ABB67E101D80}"/>
               </a:ext>
             </a:extLst>
           </p:cNvPr>
@@ -6957,7 +6957,7 @@
           <p:cNvPr id="9" name="Picture Placeholder 1">
             <a:extLst>
               <a:ext uri="{FF2B5EF4-FFF2-40B4-BE49-F238E27FC236}">
-                <a16:creationId xmlns:a16="http://schemas.microsoft.com/office/drawing/2014/main" xmlns="" id="{837F9836-5B23-424D-8C60-AC02A8512A4B}"/>
+                <a16:creationId xmlns="" xmlns:a16="http://schemas.microsoft.com/office/drawing/2014/main" id="{837F9836-5B23-424D-8C60-AC02A8512A4B}"/>
               </a:ext>
             </a:extLst>
           </p:cNvPr>
@@ -7001,7 +7001,7 @@
           <p:cNvPr id="12" name="Content Placeholder 2">
             <a:extLst>
               <a:ext uri="{FF2B5EF4-FFF2-40B4-BE49-F238E27FC236}">
-                <a16:creationId xmlns:a16="http://schemas.microsoft.com/office/drawing/2014/main" xmlns="" id="{23D3924F-A5EC-4141-A191-1A110C406AF7}"/>
+                <a16:creationId xmlns="" xmlns:a16="http://schemas.microsoft.com/office/drawing/2014/main" id="{23D3924F-A5EC-4141-A191-1A110C406AF7}"/>
               </a:ext>
             </a:extLst>
           </p:cNvPr>
@@ -7100,7 +7100,7 @@
           <p:cNvPr id="5" name="Footer Placeholder 4">
             <a:extLst>
               <a:ext uri="{FF2B5EF4-FFF2-40B4-BE49-F238E27FC236}">
-                <a16:creationId xmlns:a16="http://schemas.microsoft.com/office/drawing/2014/main" xmlns="" id="{0CB24018-690B-4552-9994-3F090E16014A}"/>
+                <a16:creationId xmlns="" xmlns:a16="http://schemas.microsoft.com/office/drawing/2014/main" id="{0CB24018-690B-4552-9994-3F090E16014A}"/>
               </a:ext>
             </a:extLst>
           </p:cNvPr>
@@ -7128,7 +7128,7 @@
           <p:cNvPr id="10" name="Slide Number Placeholder 9">
             <a:extLst>
               <a:ext uri="{FF2B5EF4-FFF2-40B4-BE49-F238E27FC236}">
-                <a16:creationId xmlns:a16="http://schemas.microsoft.com/office/drawing/2014/main" xmlns="" id="{4D8B2323-066D-4AC1-9FC8-A06D7E8B5818}"/>
+                <a16:creationId xmlns="" xmlns:a16="http://schemas.microsoft.com/office/drawing/2014/main" id="{4D8B2323-066D-4AC1-9FC8-A06D7E8B5818}"/>
               </a:ext>
             </a:extLst>
           </p:cNvPr>
@@ -7158,7 +7158,7 @@
           <p:cNvPr id="8" name="Title 1">
             <a:extLst>
               <a:ext uri="{FF2B5EF4-FFF2-40B4-BE49-F238E27FC236}">
-                <a16:creationId xmlns:a16="http://schemas.microsoft.com/office/drawing/2014/main" xmlns="" id="{F30A9B71-A789-4057-B729-15D78CF34E05}"/>
+                <a16:creationId xmlns="" xmlns:a16="http://schemas.microsoft.com/office/drawing/2014/main" id="{F30A9B71-A789-4057-B729-15D78CF34E05}"/>
               </a:ext>
             </a:extLst>
           </p:cNvPr>
@@ -7217,7 +7217,7 @@
           <p:cNvPr id="11" name="Subtitle 2">
             <a:extLst>
               <a:ext uri="{FF2B5EF4-FFF2-40B4-BE49-F238E27FC236}">
-                <a16:creationId xmlns:a16="http://schemas.microsoft.com/office/drawing/2014/main" xmlns="" id="{499E1708-B7A6-4D6F-9968-5398B335FA88}"/>
+                <a16:creationId xmlns="" xmlns:a16="http://schemas.microsoft.com/office/drawing/2014/main" id="{499E1708-B7A6-4D6F-9968-5398B335FA88}"/>
               </a:ext>
             </a:extLst>
           </p:cNvPr>
@@ -7352,7 +7352,7 @@
           <p:cNvPr id="8" name="Oval 7">
             <a:extLst>
               <a:ext uri="{FF2B5EF4-FFF2-40B4-BE49-F238E27FC236}">
-                <a16:creationId xmlns:a16="http://schemas.microsoft.com/office/drawing/2014/main" xmlns="" id="{EDE35ADD-8A62-4F35-950B-EA0CC678DE64}"/>
+                <a16:creationId xmlns="" xmlns:a16="http://schemas.microsoft.com/office/drawing/2014/main" id="{EDE35ADD-8A62-4F35-950B-EA0CC678DE64}"/>
               </a:ext>
             </a:extLst>
           </p:cNvPr>
@@ -7402,7 +7402,7 @@
           <p:cNvPr id="5" name="Subtitle 2">
             <a:extLst>
               <a:ext uri="{FF2B5EF4-FFF2-40B4-BE49-F238E27FC236}">
-                <a16:creationId xmlns:a16="http://schemas.microsoft.com/office/drawing/2014/main" xmlns="" id="{10727B06-56A8-44A2-B6C2-9ED183D107F3}"/>
+                <a16:creationId xmlns="" xmlns:a16="http://schemas.microsoft.com/office/drawing/2014/main" id="{10727B06-56A8-44A2-B6C2-9ED183D107F3}"/>
               </a:ext>
             </a:extLst>
           </p:cNvPr>
@@ -7463,7 +7463,7 @@
           <p:cNvPr id="3" name="Footer Placeholder 2">
             <a:extLst>
               <a:ext uri="{FF2B5EF4-FFF2-40B4-BE49-F238E27FC236}">
-                <a16:creationId xmlns:a16="http://schemas.microsoft.com/office/drawing/2014/main" xmlns="" id="{08CCB8C2-B6A2-4C69-8D3A-57420A034BA4}"/>
+                <a16:creationId xmlns="" xmlns:a16="http://schemas.microsoft.com/office/drawing/2014/main" id="{08CCB8C2-B6A2-4C69-8D3A-57420A034BA4}"/>
               </a:ext>
             </a:extLst>
           </p:cNvPr>
@@ -7491,7 +7491,7 @@
           <p:cNvPr id="4" name="Slide Number Placeholder 3">
             <a:extLst>
               <a:ext uri="{FF2B5EF4-FFF2-40B4-BE49-F238E27FC236}">
-                <a16:creationId xmlns:a16="http://schemas.microsoft.com/office/drawing/2014/main" xmlns="" id="{6387D291-05F0-4DD7-A728-945B6C9F2382}"/>
+                <a16:creationId xmlns="" xmlns:a16="http://schemas.microsoft.com/office/drawing/2014/main" id="{6387D291-05F0-4DD7-A728-945B6C9F2382}"/>
               </a:ext>
             </a:extLst>
           </p:cNvPr>
@@ -7521,7 +7521,7 @@
           <p:cNvPr id="6" name="Title 5">
             <a:extLst>
               <a:ext uri="{FF2B5EF4-FFF2-40B4-BE49-F238E27FC236}">
-                <a16:creationId xmlns:a16="http://schemas.microsoft.com/office/drawing/2014/main" xmlns="" id="{61A6105F-5309-4A56-AAF2-8D4A0477F00A}"/>
+                <a16:creationId xmlns="" xmlns:a16="http://schemas.microsoft.com/office/drawing/2014/main" id="{61A6105F-5309-4A56-AAF2-8D4A0477F00A}"/>
               </a:ext>
             </a:extLst>
           </p:cNvPr>
@@ -7550,7 +7550,7 @@
           <p:cNvPr id="7" name="Content Placeholder 2">
             <a:extLst>
               <a:ext uri="{FF2B5EF4-FFF2-40B4-BE49-F238E27FC236}">
-                <a16:creationId xmlns:a16="http://schemas.microsoft.com/office/drawing/2014/main" xmlns="" id="{67DBAC9A-28A2-405B-8B7E-9BE425F51354}"/>
+                <a16:creationId xmlns="" xmlns:a16="http://schemas.microsoft.com/office/drawing/2014/main" id="{67DBAC9A-28A2-405B-8B7E-9BE425F51354}"/>
               </a:ext>
             </a:extLst>
           </p:cNvPr>
@@ -7696,7 +7696,7 @@
           <p:cNvPr id="9" name="Subtitle 2">
             <a:extLst>
               <a:ext uri="{FF2B5EF4-FFF2-40B4-BE49-F238E27FC236}">
-                <a16:creationId xmlns:a16="http://schemas.microsoft.com/office/drawing/2014/main" xmlns="" id="{E4633398-8EC3-417B-BEA6-101D8F224678}"/>
+                <a16:creationId xmlns="" xmlns:a16="http://schemas.microsoft.com/office/drawing/2014/main" id="{E4633398-8EC3-417B-BEA6-101D8F224678}"/>
               </a:ext>
             </a:extLst>
           </p:cNvPr>
@@ -7757,7 +7757,7 @@
           <p:cNvPr id="3" name="Comparison Left Placeholder 1">
             <a:extLst>
               <a:ext uri="{FF2B5EF4-FFF2-40B4-BE49-F238E27FC236}">
-                <a16:creationId xmlns:a16="http://schemas.microsoft.com/office/drawing/2014/main" xmlns="" id="{9322B50D-6A7D-41C6-BA57-613BC231DF36}"/>
+                <a16:creationId xmlns="" xmlns:a16="http://schemas.microsoft.com/office/drawing/2014/main" id="{9322B50D-6A7D-41C6-BA57-613BC231DF36}"/>
               </a:ext>
             </a:extLst>
           </p:cNvPr>
@@ -7835,7 +7835,7 @@
           <p:cNvPr id="4" name="Content Placeholder 2">
             <a:extLst>
               <a:ext uri="{FF2B5EF4-FFF2-40B4-BE49-F238E27FC236}">
-                <a16:creationId xmlns:a16="http://schemas.microsoft.com/office/drawing/2014/main" xmlns="" id="{9FD584DA-F775-47B8-A1D7-6556AD5FCBD2}"/>
+                <a16:creationId xmlns="" xmlns:a16="http://schemas.microsoft.com/office/drawing/2014/main" id="{9FD584DA-F775-47B8-A1D7-6556AD5FCBD2}"/>
               </a:ext>
             </a:extLst>
           </p:cNvPr>
@@ -7944,7 +7944,7 @@
           <p:cNvPr id="12" name="Comparison Left Placeholder 2">
             <a:extLst>
               <a:ext uri="{FF2B5EF4-FFF2-40B4-BE49-F238E27FC236}">
-                <a16:creationId xmlns:a16="http://schemas.microsoft.com/office/drawing/2014/main" xmlns="" id="{78A963F8-6F6E-440E-B3B3-DDE13C083A36}"/>
+                <a16:creationId xmlns="" xmlns:a16="http://schemas.microsoft.com/office/drawing/2014/main" id="{78A963F8-6F6E-440E-B3B3-DDE13C083A36}"/>
               </a:ext>
             </a:extLst>
           </p:cNvPr>
@@ -7990,7 +7990,7 @@
           <p:cNvPr id="8" name="Text Placeholder 4">
             <a:extLst>
               <a:ext uri="{FF2B5EF4-FFF2-40B4-BE49-F238E27FC236}">
-                <a16:creationId xmlns:a16="http://schemas.microsoft.com/office/drawing/2014/main" xmlns="" id="{DF0A5256-B267-47DA-858A-0F3867CB6139}"/>
+                <a16:creationId xmlns="" xmlns:a16="http://schemas.microsoft.com/office/drawing/2014/main" id="{DF0A5256-B267-47DA-858A-0F3867CB6139}"/>
               </a:ext>
             </a:extLst>
           </p:cNvPr>
@@ -8099,7 +8099,7 @@
           <p:cNvPr id="5" name="Footer Placeholder 4">
             <a:extLst>
               <a:ext uri="{FF2B5EF4-FFF2-40B4-BE49-F238E27FC236}">
-                <a16:creationId xmlns:a16="http://schemas.microsoft.com/office/drawing/2014/main" xmlns="" id="{646B8F99-FAB0-4B33-87ED-9FF46D11A907}"/>
+                <a16:creationId xmlns="" xmlns:a16="http://schemas.microsoft.com/office/drawing/2014/main" id="{646B8F99-FAB0-4B33-87ED-9FF46D11A907}"/>
               </a:ext>
             </a:extLst>
           </p:cNvPr>
@@ -8127,7 +8127,7 @@
           <p:cNvPr id="6" name="Slide Number Placeholder 5">
             <a:extLst>
               <a:ext uri="{FF2B5EF4-FFF2-40B4-BE49-F238E27FC236}">
-                <a16:creationId xmlns:a16="http://schemas.microsoft.com/office/drawing/2014/main" xmlns="" id="{8E8FD215-79E5-48E4-95DB-2C5E5A1F8E8F}"/>
+                <a16:creationId xmlns="" xmlns:a16="http://schemas.microsoft.com/office/drawing/2014/main" id="{8E8FD215-79E5-48E4-95DB-2C5E5A1F8E8F}"/>
               </a:ext>
             </a:extLst>
           </p:cNvPr>
@@ -8157,7 +8157,7 @@
           <p:cNvPr id="7" name="Title 6">
             <a:extLst>
               <a:ext uri="{FF2B5EF4-FFF2-40B4-BE49-F238E27FC236}">
-                <a16:creationId xmlns:a16="http://schemas.microsoft.com/office/drawing/2014/main" xmlns="" id="{DF905B34-4C18-4A8D-8167-57B7BF03DE14}"/>
+                <a16:creationId xmlns="" xmlns:a16="http://schemas.microsoft.com/office/drawing/2014/main" id="{DF905B34-4C18-4A8D-8167-57B7BF03DE14}"/>
               </a:ext>
             </a:extLst>
           </p:cNvPr>
@@ -8223,7 +8223,7 @@
           <p:cNvPr id="10" name="Picture Placeholder 6">
             <a:extLst>
               <a:ext uri="{FF2B5EF4-FFF2-40B4-BE49-F238E27FC236}">
-                <a16:creationId xmlns:a16="http://schemas.microsoft.com/office/drawing/2014/main" xmlns="" id="{FDA3C530-12F9-48FC-BC5E-D34BDC504BC6}"/>
+                <a16:creationId xmlns="" xmlns:a16="http://schemas.microsoft.com/office/drawing/2014/main" id="{FDA3C530-12F9-48FC-BC5E-D34BDC504BC6}"/>
               </a:ext>
             </a:extLst>
           </p:cNvPr>
@@ -8267,7 +8267,7 @@
           <p:cNvPr id="3" name="Content Placeholder 2">
             <a:extLst>
               <a:ext uri="{FF2B5EF4-FFF2-40B4-BE49-F238E27FC236}">
-                <a16:creationId xmlns:a16="http://schemas.microsoft.com/office/drawing/2014/main" xmlns="" id="{A22238F2-C6EC-476F-8371-119AECBA5622}"/>
+                <a16:creationId xmlns="" xmlns:a16="http://schemas.microsoft.com/office/drawing/2014/main" id="{A22238F2-C6EC-476F-8371-119AECBA5622}"/>
               </a:ext>
             </a:extLst>
           </p:cNvPr>
@@ -8356,7 +8356,7 @@
           <p:cNvPr id="4" name="Footer Placeholder 3">
             <a:extLst>
               <a:ext uri="{FF2B5EF4-FFF2-40B4-BE49-F238E27FC236}">
-                <a16:creationId xmlns:a16="http://schemas.microsoft.com/office/drawing/2014/main" xmlns="" id="{57847F90-9DB6-4832-9EB7-393AADAE8B70}"/>
+                <a16:creationId xmlns="" xmlns:a16="http://schemas.microsoft.com/office/drawing/2014/main" id="{57847F90-9DB6-4832-9EB7-393AADAE8B70}"/>
               </a:ext>
             </a:extLst>
           </p:cNvPr>
@@ -8384,7 +8384,7 @@
           <p:cNvPr id="2" name="Slide Number Placeholder 1">
             <a:extLst>
               <a:ext uri="{FF2B5EF4-FFF2-40B4-BE49-F238E27FC236}">
-                <a16:creationId xmlns:a16="http://schemas.microsoft.com/office/drawing/2014/main" xmlns="" id="{3EC14527-4DF5-4A98-AE66-C80F3B8E6D2E}"/>
+                <a16:creationId xmlns="" xmlns:a16="http://schemas.microsoft.com/office/drawing/2014/main" id="{3EC14527-4DF5-4A98-AE66-C80F3B8E6D2E}"/>
               </a:ext>
             </a:extLst>
           </p:cNvPr>
@@ -8414,7 +8414,7 @@
           <p:cNvPr id="5" name="Title 4">
             <a:extLst>
               <a:ext uri="{FF2B5EF4-FFF2-40B4-BE49-F238E27FC236}">
-                <a16:creationId xmlns:a16="http://schemas.microsoft.com/office/drawing/2014/main" xmlns="" id="{AB05C513-FBE3-4BA7-9084-69899356E59F}"/>
+                <a16:creationId xmlns="" xmlns:a16="http://schemas.microsoft.com/office/drawing/2014/main" id="{AB05C513-FBE3-4BA7-9084-69899356E59F}"/>
               </a:ext>
             </a:extLst>
           </p:cNvPr>
@@ -8480,7 +8480,7 @@
           <p:cNvPr id="9" name="Picture Placeholder 1">
             <a:extLst>
               <a:ext uri="{FF2B5EF4-FFF2-40B4-BE49-F238E27FC236}">
-                <a16:creationId xmlns:a16="http://schemas.microsoft.com/office/drawing/2014/main" xmlns="" id="{837F9836-5B23-424D-8C60-AC02A8512A4B}"/>
+                <a16:creationId xmlns="" xmlns:a16="http://schemas.microsoft.com/office/drawing/2014/main" id="{837F9836-5B23-424D-8C60-AC02A8512A4B}"/>
               </a:ext>
             </a:extLst>
           </p:cNvPr>
@@ -8524,7 +8524,7 @@
           <p:cNvPr id="2" name="Title 1">
             <a:extLst>
               <a:ext uri="{FF2B5EF4-FFF2-40B4-BE49-F238E27FC236}">
-                <a16:creationId xmlns:a16="http://schemas.microsoft.com/office/drawing/2014/main" xmlns="" id="{00F23EB7-E336-46EB-A4A0-3DB7A6BF4CE1}"/>
+                <a16:creationId xmlns="" xmlns:a16="http://schemas.microsoft.com/office/drawing/2014/main" id="{00F23EB7-E336-46EB-A4A0-3DB7A6BF4CE1}"/>
               </a:ext>
             </a:extLst>
           </p:cNvPr>
@@ -8583,7 +8583,7 @@
           <p:cNvPr id="3" name="Text Placeholder 5">
             <a:extLst>
               <a:ext uri="{FF2B5EF4-FFF2-40B4-BE49-F238E27FC236}">
-                <a16:creationId xmlns:a16="http://schemas.microsoft.com/office/drawing/2014/main" xmlns="" id="{C9980B88-3F4A-4688-9ED0-17EF37E62D93}"/>
+                <a16:creationId xmlns="" xmlns:a16="http://schemas.microsoft.com/office/drawing/2014/main" id="{C9980B88-3F4A-4688-9ED0-17EF37E62D93}"/>
               </a:ext>
             </a:extLst>
           </p:cNvPr>
@@ -8678,7 +8678,7 @@
           <p:cNvPr id="20" name="Text Placeholder 6">
             <a:extLst>
               <a:ext uri="{FF2B5EF4-FFF2-40B4-BE49-F238E27FC236}">
-                <a16:creationId xmlns:a16="http://schemas.microsoft.com/office/drawing/2014/main" xmlns="" id="{CEB7A85F-8707-4B62-B299-F53931B8617A}"/>
+                <a16:creationId xmlns="" xmlns:a16="http://schemas.microsoft.com/office/drawing/2014/main" id="{CEB7A85F-8707-4B62-B299-F53931B8617A}"/>
               </a:ext>
             </a:extLst>
           </p:cNvPr>
@@ -8739,7 +8739,7 @@
           <p:cNvPr id="21" name="Text Placeholder 7">
             <a:extLst>
               <a:ext uri="{FF2B5EF4-FFF2-40B4-BE49-F238E27FC236}">
-                <a16:creationId xmlns:a16="http://schemas.microsoft.com/office/drawing/2014/main" xmlns="" id="{BA4C7E3C-7C17-46E9-928A-D3D505EEAAE5}"/>
+                <a16:creationId xmlns="" xmlns:a16="http://schemas.microsoft.com/office/drawing/2014/main" id="{BA4C7E3C-7C17-46E9-928A-D3D505EEAAE5}"/>
               </a:ext>
             </a:extLst>
           </p:cNvPr>
@@ -8800,7 +8800,7 @@
           <p:cNvPr id="22" name="Text Placeholder 8">
             <a:extLst>
               <a:ext uri="{FF2B5EF4-FFF2-40B4-BE49-F238E27FC236}">
-                <a16:creationId xmlns:a16="http://schemas.microsoft.com/office/drawing/2014/main" xmlns="" id="{6ADD6EB2-7D8E-4991-87A6-02723731EBE1}"/>
+                <a16:creationId xmlns="" xmlns:a16="http://schemas.microsoft.com/office/drawing/2014/main" id="{6ADD6EB2-7D8E-4991-87A6-02723731EBE1}"/>
               </a:ext>
             </a:extLst>
           </p:cNvPr>
@@ -8861,7 +8861,7 @@
           <p:cNvPr id="7" name="Rectangle 6">
             <a:extLst>
               <a:ext uri="{FF2B5EF4-FFF2-40B4-BE49-F238E27FC236}">
-                <a16:creationId xmlns:a16="http://schemas.microsoft.com/office/drawing/2014/main" xmlns="" id="{DBE77267-9F51-4226-989C-ED57465596ED}"/>
+                <a16:creationId xmlns="" xmlns:a16="http://schemas.microsoft.com/office/drawing/2014/main" id="{DBE77267-9F51-4226-989C-ED57465596ED}"/>
               </a:ext>
             </a:extLst>
           </p:cNvPr>
@@ -8926,7 +8926,7 @@
           <p:cNvPr id="8" name="Rectangle 7">
             <a:extLst>
               <a:ext uri="{FF2B5EF4-FFF2-40B4-BE49-F238E27FC236}">
-                <a16:creationId xmlns:a16="http://schemas.microsoft.com/office/drawing/2014/main" xmlns="" id="{0A2CC678-341F-44F8-AE2E-A6C84D75C56A}"/>
+                <a16:creationId xmlns="" xmlns:a16="http://schemas.microsoft.com/office/drawing/2014/main" id="{0A2CC678-341F-44F8-AE2E-A6C84D75C56A}"/>
               </a:ext>
             </a:extLst>
           </p:cNvPr>
@@ -8991,7 +8991,7 @@
           <p:cNvPr id="11" name="Rectangle 10">
             <a:extLst>
               <a:ext uri="{FF2B5EF4-FFF2-40B4-BE49-F238E27FC236}">
-                <a16:creationId xmlns:a16="http://schemas.microsoft.com/office/drawing/2014/main" xmlns="" id="{A87A001A-FE8B-41CE-AC81-69D4A2339087}"/>
+                <a16:creationId xmlns="" xmlns:a16="http://schemas.microsoft.com/office/drawing/2014/main" id="{A87A001A-FE8B-41CE-AC81-69D4A2339087}"/>
               </a:ext>
             </a:extLst>
           </p:cNvPr>
@@ -9056,7 +9056,7 @@
           <p:cNvPr id="12" name="Rectangle 11">
             <a:extLst>
               <a:ext uri="{FF2B5EF4-FFF2-40B4-BE49-F238E27FC236}">
-                <a16:creationId xmlns:a16="http://schemas.microsoft.com/office/drawing/2014/main" xmlns="" id="{CB1416AC-94BD-4442-B771-E1ACAA70367E}"/>
+                <a16:creationId xmlns="" xmlns:a16="http://schemas.microsoft.com/office/drawing/2014/main" id="{CB1416AC-94BD-4442-B771-E1ACAA70367E}"/>
               </a:ext>
             </a:extLst>
           </p:cNvPr>
@@ -9121,7 +9121,7 @@
           <p:cNvPr id="13" name="Freeform: Shape 12">
             <a:extLst>
               <a:ext uri="{FF2B5EF4-FFF2-40B4-BE49-F238E27FC236}">
-                <a16:creationId xmlns:a16="http://schemas.microsoft.com/office/drawing/2014/main" xmlns="" id="{BDB31DC4-A207-4A23-8E7A-40D0ECD04FDD}"/>
+                <a16:creationId xmlns="" xmlns:a16="http://schemas.microsoft.com/office/drawing/2014/main" id="{BDB31DC4-A207-4A23-8E7A-40D0ECD04FDD}"/>
               </a:ext>
             </a:extLst>
           </p:cNvPr>
@@ -9316,7 +9316,7 @@
           <p:cNvPr id="23" name="Text Placeholder 6">
             <a:extLst>
               <a:ext uri="{FF2B5EF4-FFF2-40B4-BE49-F238E27FC236}">
-                <a16:creationId xmlns:a16="http://schemas.microsoft.com/office/drawing/2014/main" xmlns="" id="{94054031-2BEC-4DA9-90C3-616D2D61AB85}"/>
+                <a16:creationId xmlns="" xmlns:a16="http://schemas.microsoft.com/office/drawing/2014/main" id="{94054031-2BEC-4DA9-90C3-616D2D61AB85}"/>
               </a:ext>
             </a:extLst>
           </p:cNvPr>
@@ -9423,7 +9423,7 @@
           <p:cNvPr id="8" name="Rectangle 7">
             <a:extLst>
               <a:ext uri="{FF2B5EF4-FFF2-40B4-BE49-F238E27FC236}">
-                <a16:creationId xmlns:a16="http://schemas.microsoft.com/office/drawing/2014/main" xmlns="" id="{C6726F2C-157B-477E-AD76-8F54126834C2}"/>
+                <a16:creationId xmlns="" xmlns:a16="http://schemas.microsoft.com/office/drawing/2014/main" id="{C6726F2C-157B-477E-AD76-8F54126834C2}"/>
               </a:ext>
             </a:extLst>
           </p:cNvPr>
@@ -9488,7 +9488,7 @@
           <p:cNvPr id="2" name="Title Placeholder 1">
             <a:extLst>
               <a:ext uri="{FF2B5EF4-FFF2-40B4-BE49-F238E27FC236}">
-                <a16:creationId xmlns:a16="http://schemas.microsoft.com/office/drawing/2014/main" xmlns="" id="{090F41A2-6535-4CA6-81E4-026A5B56D9D7}"/>
+                <a16:creationId xmlns="" xmlns:a16="http://schemas.microsoft.com/office/drawing/2014/main" id="{090F41A2-6535-4CA6-81E4-026A5B56D9D7}"/>
               </a:ext>
             </a:extLst>
           </p:cNvPr>
@@ -9526,7 +9526,7 @@
           <p:cNvPr id="3" name="Text Placeholder 2">
             <a:extLst>
               <a:ext uri="{FF2B5EF4-FFF2-40B4-BE49-F238E27FC236}">
-                <a16:creationId xmlns:a16="http://schemas.microsoft.com/office/drawing/2014/main" xmlns="" id="{213AB95C-7DD4-4796-80E4-1B7466A2A037}"/>
+                <a16:creationId xmlns="" xmlns:a16="http://schemas.microsoft.com/office/drawing/2014/main" id="{213AB95C-7DD4-4796-80E4-1B7466A2A037}"/>
               </a:ext>
             </a:extLst>
           </p:cNvPr>
@@ -9594,7 +9594,7 @@
           <p:cNvPr id="7" name="Rectangle 6">
             <a:extLst>
               <a:ext uri="{FF2B5EF4-FFF2-40B4-BE49-F238E27FC236}">
-                <a16:creationId xmlns:a16="http://schemas.microsoft.com/office/drawing/2014/main" xmlns="" id="{474FB90F-5E6B-4508-96BB-939635D11AFF}"/>
+                <a16:creationId xmlns="" xmlns:a16="http://schemas.microsoft.com/office/drawing/2014/main" id="{474FB90F-5E6B-4508-96BB-939635D11AFF}"/>
               </a:ext>
             </a:extLst>
           </p:cNvPr>
@@ -9659,7 +9659,7 @@
           <p:cNvPr id="9" name="Rectangle 8">
             <a:extLst>
               <a:ext uri="{FF2B5EF4-FFF2-40B4-BE49-F238E27FC236}">
-                <a16:creationId xmlns:a16="http://schemas.microsoft.com/office/drawing/2014/main" xmlns="" id="{774A1CB7-B157-440C-BA82-A62890EF3721}"/>
+                <a16:creationId xmlns="" xmlns:a16="http://schemas.microsoft.com/office/drawing/2014/main" id="{774A1CB7-B157-440C-BA82-A62890EF3721}"/>
               </a:ext>
             </a:extLst>
           </p:cNvPr>
@@ -9724,7 +9724,7 @@
           <p:cNvPr id="10" name="Rectangle 9">
             <a:extLst>
               <a:ext uri="{FF2B5EF4-FFF2-40B4-BE49-F238E27FC236}">
-                <a16:creationId xmlns:a16="http://schemas.microsoft.com/office/drawing/2014/main" xmlns="" id="{EE5B1BAC-5CBE-4B0E-B0AA-1C05EBEE964E}"/>
+                <a16:creationId xmlns="" xmlns:a16="http://schemas.microsoft.com/office/drawing/2014/main" id="{EE5B1BAC-5CBE-4B0E-B0AA-1C05EBEE964E}"/>
               </a:ext>
             </a:extLst>
           </p:cNvPr>
@@ -9789,7 +9789,7 @@
           <p:cNvPr id="18" name="Freeform: Shape 17">
             <a:extLst>
               <a:ext uri="{FF2B5EF4-FFF2-40B4-BE49-F238E27FC236}">
-                <a16:creationId xmlns:a16="http://schemas.microsoft.com/office/drawing/2014/main" xmlns="" id="{168BD16A-5998-4CCA-B0F2-62F67B639AFD}"/>
+                <a16:creationId xmlns="" xmlns:a16="http://schemas.microsoft.com/office/drawing/2014/main" id="{168BD16A-5998-4CCA-B0F2-62F67B639AFD}"/>
               </a:ext>
             </a:extLst>
           </p:cNvPr>
@@ -9984,7 +9984,7 @@
           <p:cNvPr id="6" name="Slide Number Placeholder 5">
             <a:extLst>
               <a:ext uri="{FF2B5EF4-FFF2-40B4-BE49-F238E27FC236}">
-                <a16:creationId xmlns:a16="http://schemas.microsoft.com/office/drawing/2014/main" xmlns="" id="{5ECA3099-A94F-4C3E-BC29-780EDD38F722}"/>
+                <a16:creationId xmlns="" xmlns:a16="http://schemas.microsoft.com/office/drawing/2014/main" id="{5ECA3099-A94F-4C3E-BC29-780EDD38F722}"/>
               </a:ext>
             </a:extLst>
           </p:cNvPr>
@@ -10044,7 +10044,7 @@
           <p:cNvPr id="5" name="Footer Placeholder 4">
             <a:extLst>
               <a:ext uri="{FF2B5EF4-FFF2-40B4-BE49-F238E27FC236}">
-                <a16:creationId xmlns:a16="http://schemas.microsoft.com/office/drawing/2014/main" xmlns="" id="{58879C91-B77F-4273-9A27-A3535FB889DB}"/>
+                <a16:creationId xmlns="" xmlns:a16="http://schemas.microsoft.com/office/drawing/2014/main" id="{58879C91-B77F-4273-9A27-A3535FB889DB}"/>
               </a:ext>
             </a:extLst>
           </p:cNvPr>
@@ -10468,7 +10468,7 @@
           <p:cNvPr id="3" name="Title 2">
             <a:extLst>
               <a:ext uri="{FF2B5EF4-FFF2-40B4-BE49-F238E27FC236}">
-                <a16:creationId xmlns:a16="http://schemas.microsoft.com/office/drawing/2014/main" xmlns="" id="{200B3D2B-613A-41BE-987D-E6A1324B456D}"/>
+                <a16:creationId xmlns="" xmlns:a16="http://schemas.microsoft.com/office/drawing/2014/main" id="{200B3D2B-613A-41BE-987D-E6A1324B456D}"/>
               </a:ext>
             </a:extLst>
           </p:cNvPr>
@@ -10507,7 +10507,7 @@
           <p:cNvPr id="4" name="Subtitle 3">
             <a:extLst>
               <a:ext uri="{FF2B5EF4-FFF2-40B4-BE49-F238E27FC236}">
-                <a16:creationId xmlns:a16="http://schemas.microsoft.com/office/drawing/2014/main" xmlns="" id="{4772945D-CA91-4CFE-8EB7-941C7618C994}"/>
+                <a16:creationId xmlns="" xmlns:a16="http://schemas.microsoft.com/office/drawing/2014/main" id="{4772945D-CA91-4CFE-8EB7-941C7618C994}"/>
               </a:ext>
             </a:extLst>
           </p:cNvPr>
@@ -10595,7 +10595,7 @@
           <p:cNvPr id="13" name="Content Placeholder 12">
             <a:extLst>
               <a:ext uri="{FF2B5EF4-FFF2-40B4-BE49-F238E27FC236}">
-                <a16:creationId xmlns:a16="http://schemas.microsoft.com/office/drawing/2014/main" xmlns="" id="{B3B7D2F0-D16B-4916-87C1-9B29D9E765CF}"/>
+                <a16:creationId xmlns="" xmlns:a16="http://schemas.microsoft.com/office/drawing/2014/main" id="{B3B7D2F0-D16B-4916-87C1-9B29D9E765CF}"/>
               </a:ext>
             </a:extLst>
           </p:cNvPr>
@@ -10690,7 +10690,7 @@
           <p:cNvPr id="25" name="Subtitle 24">
             <a:extLst>
               <a:ext uri="{FF2B5EF4-FFF2-40B4-BE49-F238E27FC236}">
-                <a16:creationId xmlns:a16="http://schemas.microsoft.com/office/drawing/2014/main" xmlns="" id="{66EEB513-467F-4991-82EC-AD68FC13249F}"/>
+                <a16:creationId xmlns="" xmlns:a16="http://schemas.microsoft.com/office/drawing/2014/main" id="{66EEB513-467F-4991-82EC-AD68FC13249F}"/>
               </a:ext>
             </a:extLst>
           </p:cNvPr>
@@ -10724,7 +10724,7 @@
           <p:cNvPr id="6" name="Slide Number Placeholder 5">
             <a:extLst>
               <a:ext uri="{FF2B5EF4-FFF2-40B4-BE49-F238E27FC236}">
-                <a16:creationId xmlns:a16="http://schemas.microsoft.com/office/drawing/2014/main" xmlns="" id="{1C554D9F-1895-486E-BFBA-905BB2D29E08}"/>
+                <a16:creationId xmlns="" xmlns:a16="http://schemas.microsoft.com/office/drawing/2014/main" id="{1C554D9F-1895-486E-BFBA-905BB2D29E08}"/>
               </a:ext>
             </a:extLst>
           </p:cNvPr>
@@ -10832,7 +10832,7 @@
           <p:cNvPr id="2" name="Title 1">
             <a:extLst>
               <a:ext uri="{FF2B5EF4-FFF2-40B4-BE49-F238E27FC236}">
-                <a16:creationId xmlns:a16="http://schemas.microsoft.com/office/drawing/2014/main" xmlns="" id="{19304E83-A4F0-49C5-BB01-F5773509A2B3}"/>
+                <a16:creationId xmlns="" xmlns:a16="http://schemas.microsoft.com/office/drawing/2014/main" id="{19304E83-A4F0-49C5-BB01-F5773509A2B3}"/>
               </a:ext>
             </a:extLst>
           </p:cNvPr>
@@ -10866,7 +10866,7 @@
           <p:cNvPr id="3" name="Text Placeholder 2">
             <a:extLst>
               <a:ext uri="{FF2B5EF4-FFF2-40B4-BE49-F238E27FC236}">
-                <a16:creationId xmlns:a16="http://schemas.microsoft.com/office/drawing/2014/main" xmlns="" id="{7CA42D59-EAD6-4F95-84F1-32A30F057856}"/>
+                <a16:creationId xmlns="" xmlns:a16="http://schemas.microsoft.com/office/drawing/2014/main" id="{7CA42D59-EAD6-4F95-84F1-32A30F057856}"/>
               </a:ext>
             </a:extLst>
           </p:cNvPr>
@@ -10900,7 +10900,7 @@
           <p:cNvPr id="4" name="Text Placeholder 3">
             <a:extLst>
               <a:ext uri="{FF2B5EF4-FFF2-40B4-BE49-F238E27FC236}">
-                <a16:creationId xmlns:a16="http://schemas.microsoft.com/office/drawing/2014/main" xmlns="" id="{6AB259A0-0017-492F-A0DC-4B70C7052AE0}"/>
+                <a16:creationId xmlns="" xmlns:a16="http://schemas.microsoft.com/office/drawing/2014/main" id="{6AB259A0-0017-492F-A0DC-4B70C7052AE0}"/>
               </a:ext>
             </a:extLst>
           </p:cNvPr>
@@ -10934,7 +10934,7 @@
           <p:cNvPr id="5" name="Content Placeholder 4">
             <a:extLst>
               <a:ext uri="{FF2B5EF4-FFF2-40B4-BE49-F238E27FC236}">
-                <a16:creationId xmlns:a16="http://schemas.microsoft.com/office/drawing/2014/main" xmlns="" id="{CEEB3BAE-C0B2-447C-B8BE-96C6BD84D658}"/>
+                <a16:creationId xmlns="" xmlns:a16="http://schemas.microsoft.com/office/drawing/2014/main" id="{CEEB3BAE-C0B2-447C-B8BE-96C6BD84D658}"/>
               </a:ext>
             </a:extLst>
           </p:cNvPr>
@@ -11015,7 +11015,7 @@
           <p:cNvPr id="6" name="Text Placeholder 5">
             <a:extLst>
               <a:ext uri="{FF2B5EF4-FFF2-40B4-BE49-F238E27FC236}">
-                <a16:creationId xmlns:a16="http://schemas.microsoft.com/office/drawing/2014/main" xmlns="" id="{B237D1CA-B91A-410E-A968-D017BBE99F99}"/>
+                <a16:creationId xmlns="" xmlns:a16="http://schemas.microsoft.com/office/drawing/2014/main" id="{B237D1CA-B91A-410E-A968-D017BBE99F99}"/>
               </a:ext>
             </a:extLst>
           </p:cNvPr>
@@ -11049,7 +11049,7 @@
           <p:cNvPr id="7" name="Text Placeholder 6">
             <a:extLst>
               <a:ext uri="{FF2B5EF4-FFF2-40B4-BE49-F238E27FC236}">
-                <a16:creationId xmlns:a16="http://schemas.microsoft.com/office/drawing/2014/main" xmlns="" id="{26A87885-D672-4CF9-A78D-CFE98385B03A}"/>
+                <a16:creationId xmlns="" xmlns:a16="http://schemas.microsoft.com/office/drawing/2014/main" id="{26A87885-D672-4CF9-A78D-CFE98385B03A}"/>
               </a:ext>
             </a:extLst>
           </p:cNvPr>
@@ -11107,7 +11107,7 @@
           <p:cNvPr id="8" name="Slide Number Placeholder 7">
             <a:extLst>
               <a:ext uri="{FF2B5EF4-FFF2-40B4-BE49-F238E27FC236}">
-                <a16:creationId xmlns:a16="http://schemas.microsoft.com/office/drawing/2014/main" xmlns="" id="{E6AC9832-FB01-464A-9824-61887B77997E}"/>
+                <a16:creationId xmlns="" xmlns:a16="http://schemas.microsoft.com/office/drawing/2014/main" id="{E6AC9832-FB01-464A-9824-61887B77997E}"/>
               </a:ext>
             </a:extLst>
           </p:cNvPr>
@@ -11222,7 +11222,7 @@
           <p:cNvPr id="5" name="Slide Number Placeholder 4">
             <a:extLst>
               <a:ext uri="{FF2B5EF4-FFF2-40B4-BE49-F238E27FC236}">
-                <a16:creationId xmlns:a16="http://schemas.microsoft.com/office/drawing/2014/main" xmlns="" id="{BDD5A594-D852-43BB-B591-E9D9027253BD}"/>
+                <a16:creationId xmlns="" xmlns:a16="http://schemas.microsoft.com/office/drawing/2014/main" id="{BDD5A594-D852-43BB-B591-E9D9027253BD}"/>
               </a:ext>
             </a:extLst>
           </p:cNvPr>
@@ -11257,7 +11257,7 @@
           <p:cNvPr id="10" name="Content Placeholder 3">
             <a:extLst>
               <a:ext uri="{FF2B5EF4-FFF2-40B4-BE49-F238E27FC236}">
-                <a16:creationId xmlns:a16="http://schemas.microsoft.com/office/drawing/2014/main" xmlns="" id="{3B86E961-B76E-423F-995E-11B31E921437}"/>
+                <a16:creationId xmlns="" xmlns:a16="http://schemas.microsoft.com/office/drawing/2014/main" id="{3B86E961-B76E-423F-995E-11B31E921437}"/>
               </a:ext>
             </a:extLst>
           </p:cNvPr>
@@ -12726,23 +12726,6 @@
 </file>
 
 <file path=customXml/item1.xml><?xml version="1.0" encoding="utf-8"?>
-<p:properties xmlns:p="http://schemas.microsoft.com/office/2006/metadata/properties" xmlns:xsi="http://www.w3.org/2001/XMLSchema-instance" xmlns:pc="http://schemas.microsoft.com/office/infopath/2007/PartnerControls">
-  <documentManagement>
-    <MediaServiceKeyPoints xmlns="71af3243-3dd4-4a8d-8c0d-dd76da1f02a5" xsi:nil="true"/>
-  </documentManagement>
-</p:properties>
-</file>
-
-<file path=customXml/item2.xml><?xml version="1.0" encoding="utf-8"?>
-<?mso-contentType ?>
-<FormTemplates xmlns="http://schemas.microsoft.com/sharepoint/v3/contenttype/forms">
-  <Display>DocumentLibraryForm</Display>
-  <Edit>DocumentLibraryForm</Edit>
-  <New>DocumentLibraryForm</New>
-</FormTemplates>
-</file>
-
-<file path=customXml/item3.xml><?xml version="1.0" encoding="utf-8"?>
 <ct:contentTypeSchema xmlns:ct="http://schemas.microsoft.com/office/2006/metadata/contentType" xmlns:ma="http://schemas.microsoft.com/office/2006/metadata/properties/metaAttributes" ct:_="" ma:_="" ma:contentTypeName="Document" ma:contentTypeID="0x01010079F111ED35F8CC479449609E8A0923A6" ma:contentTypeVersion="11" ma:contentTypeDescription="Create a new document." ma:contentTypeScope="" ma:versionID="96291512c1ee715ab617f4c07df79fc1">
   <xsd:schema xmlns:xsd="http://www.w3.org/2001/XMLSchema" xmlns:xs="http://www.w3.org/2001/XMLSchema" xmlns:p="http://schemas.microsoft.com/office/2006/metadata/properties" xmlns:ns2="71af3243-3dd4-4a8d-8c0d-dd76da1f02a5" xmlns:ns3="16c05727-aa75-4e4a-9b5f-8a80a1165891" targetNamespace="http://schemas.microsoft.com/office/2006/metadata/properties" ma:root="true" ma:fieldsID="8256c27c40ca5c40ce1cf6c44f0205df" ns2:_="" ns3:_="">
     <xsd:import namespace="71af3243-3dd4-4a8d-8c0d-dd76da1f02a5"/>
@@ -12953,32 +12936,24 @@
 </ct:contentTypeSchema>
 </file>
 
-<file path=customXml/itemProps1.xml><?xml version="1.0" encoding="utf-8"?>
-<ds:datastoreItem xmlns:ds="http://schemas.openxmlformats.org/officeDocument/2006/customXml" ds:itemID="{7CCF2BA7-0062-4891-9E27-12FDBCAC65DB}">
-  <ds:schemaRefs>
-    <ds:schemaRef ds:uri="http://schemas.microsoft.com/office/2006/documentManagement/types"/>
-    <ds:schemaRef ds:uri="http://schemas.microsoft.com/office/2006/metadata/properties"/>
-    <ds:schemaRef ds:uri="http://purl.org/dc/terms/"/>
-    <ds:schemaRef ds:uri="http://schemas.openxmlformats.org/package/2006/metadata/core-properties"/>
-    <ds:schemaRef ds:uri="16c05727-aa75-4e4a-9b5f-8a80a1165891"/>
-    <ds:schemaRef ds:uri="http://purl.org/dc/dcmitype/"/>
-    <ds:schemaRef ds:uri="http://schemas.microsoft.com/office/infopath/2007/PartnerControls"/>
-    <ds:schemaRef ds:uri="71af3243-3dd4-4a8d-8c0d-dd76da1f02a5"/>
-    <ds:schemaRef ds:uri="http://www.w3.org/XML/1998/namespace"/>
-    <ds:schemaRef ds:uri="http://purl.org/dc/elements/1.1/"/>
-  </ds:schemaRefs>
-</ds:datastoreItem>
+<file path=customXml/item2.xml><?xml version="1.0" encoding="utf-8"?>
+<?mso-contentType ?>
+<FormTemplates xmlns="http://schemas.microsoft.com/sharepoint/v3/contenttype/forms">
+  <Display>DocumentLibraryForm</Display>
+  <Edit>DocumentLibraryForm</Edit>
+  <New>DocumentLibraryForm</New>
+</FormTemplates>
 </file>
 
-<file path=customXml/itemProps2.xml><?xml version="1.0" encoding="utf-8"?>
-<ds:datastoreItem xmlns:ds="http://schemas.openxmlformats.org/officeDocument/2006/customXml" ds:itemID="{04A2ABDF-D598-4D0B-98AA-F591A2A4B7F6}">
-  <ds:schemaRefs>
-    <ds:schemaRef ds:uri="http://schemas.microsoft.com/sharepoint/v3/contenttype/forms"/>
-  </ds:schemaRefs>
-</ds:datastoreItem>
+<file path=customXml/item3.xml><?xml version="1.0" encoding="utf-8"?>
+<p:properties xmlns:p="http://schemas.microsoft.com/office/2006/metadata/properties" xmlns:xsi="http://www.w3.org/2001/XMLSchema-instance" xmlns:pc="http://schemas.microsoft.com/office/infopath/2007/PartnerControls">
+  <documentManagement>
+    <MediaServiceKeyPoints xmlns="71af3243-3dd4-4a8d-8c0d-dd76da1f02a5" xsi:nil="true"/>
+  </documentManagement>
+</p:properties>
 </file>
 
-<file path=customXml/itemProps3.xml><?xml version="1.0" encoding="utf-8"?>
+<file path=customXml/itemProps1.xml><?xml version="1.0" encoding="utf-8"?>
 <ds:datastoreItem xmlns:ds="http://schemas.openxmlformats.org/officeDocument/2006/customXml" ds:itemID="{AD7CDC51-B329-4B42-A6BA-DEECCF4DD10C}">
   <ds:schemaRefs>
     <ds:schemaRef ds:uri="http://schemas.microsoft.com/office/2006/metadata/contentType"/>
@@ -12995,4 +12970,29 @@
     <ds:schemaRef ds:uri="http://schemas.microsoft.com/internal/obd"/>
   </ds:schemaRefs>
 </ds:datastoreItem>
+</file>
+
+<file path=customXml/itemProps2.xml><?xml version="1.0" encoding="utf-8"?>
+<ds:datastoreItem xmlns:ds="http://schemas.openxmlformats.org/officeDocument/2006/customXml" ds:itemID="{04A2ABDF-D598-4D0B-98AA-F591A2A4B7F6}">
+  <ds:schemaRefs>
+    <ds:schemaRef ds:uri="http://schemas.microsoft.com/sharepoint/v3/contenttype/forms"/>
+  </ds:schemaRefs>
+</ds:datastoreItem>
+</file>
+
+<file path=customXml/itemProps3.xml><?xml version="1.0" encoding="utf-8"?>
+<ds:datastoreItem xmlns:ds="http://schemas.openxmlformats.org/officeDocument/2006/customXml" ds:itemID="{7CCF2BA7-0062-4891-9E27-12FDBCAC65DB}">
+  <ds:schemaRefs>
+    <ds:schemaRef ds:uri="http://schemas.microsoft.com/office/2006/documentManagement/types"/>
+    <ds:schemaRef ds:uri="http://schemas.microsoft.com/office/2006/metadata/properties"/>
+    <ds:schemaRef ds:uri="http://purl.org/dc/terms/"/>
+    <ds:schemaRef ds:uri="http://schemas.openxmlformats.org/package/2006/metadata/core-properties"/>
+    <ds:schemaRef ds:uri="16c05727-aa75-4e4a-9b5f-8a80a1165891"/>
+    <ds:schemaRef ds:uri="http://purl.org/dc/dcmitype/"/>
+    <ds:schemaRef ds:uri="http://schemas.microsoft.com/office/infopath/2007/PartnerControls"/>
+    <ds:schemaRef ds:uri="71af3243-3dd4-4a8d-8c0d-dd76da1f02a5"/>
+    <ds:schemaRef ds:uri="http://www.w3.org/XML/1998/namespace"/>
+    <ds:schemaRef ds:uri="http://purl.org/dc/elements/1.1/"/>
+  </ds:schemaRefs>
+</ds:datastoreItem>
 </file>
</xml_diff>